<commit_message>
Add samples, fix ABAP includes and messages
Rename function modules to .abap, fix corrupted Turkish characters in messages, and update function logic/messages. Add new sample reports: PRATİK login (ZLOGIN.abap) and rewritten ZPRATIK03.abap with proper zero-division checks and clearer form usage. Replace legacy include with TEMEL/ZINCLUDE.abap (adds shared forms) and update TEMEL/ZEVENT.abap to call the new forms. Remove old legacy files and update binary docs/presentations (Kodlar.docx, Tanımlar.pptx). Overall: cleanup, encoding fixes, and new/clarified sample code.
</commit_message>
<xml_diff>
--- a/Tanımlar.pptx
+++ b/Tanımlar.pptx
@@ -5,13 +5,18 @@
     <p:sldMasterId id="2147483648" r:id="rId1"/>
   </p:sldMasterIdLst>
   <p:sldIdLst>
-    <p:sldId id="256" r:id="rId2"/>
-    <p:sldId id="257" r:id="rId3"/>
-    <p:sldId id="258" r:id="rId4"/>
-    <p:sldId id="259" r:id="rId5"/>
-    <p:sldId id="260" r:id="rId6"/>
-    <p:sldId id="261" r:id="rId7"/>
-    <p:sldId id="262" r:id="rId8"/>
+    <p:sldId id="257" r:id="rId2"/>
+    <p:sldId id="258" r:id="rId3"/>
+    <p:sldId id="259" r:id="rId4"/>
+    <p:sldId id="260" r:id="rId5"/>
+    <p:sldId id="261" r:id="rId6"/>
+    <p:sldId id="262" r:id="rId7"/>
+    <p:sldId id="263" r:id="rId8"/>
+    <p:sldId id="264" r:id="rId9"/>
+    <p:sldId id="265" r:id="rId10"/>
+    <p:sldId id="266" r:id="rId11"/>
+    <p:sldId id="267" r:id="rId12"/>
+    <p:sldId id="268" r:id="rId13"/>
   </p:sldIdLst>
   <p:sldSz cx="12192000" cy="6858000"/>
   <p:notesSz cx="6858000" cy="9144000"/>
@@ -265,7 +270,7 @@
           <a:p>
             <a:fld id="{A8CEC974-71DF-4346-914E-9676B79374EF}" type="datetimeFigureOut">
               <a:rPr lang="tr-TR" smtClean="0"/>
-              <a:t>6.02.2026</a:t>
+              <a:t>8.02.2026</a:t>
             </a:fld>
             <a:endParaRPr lang="tr-TR"/>
           </a:p>
@@ -463,7 +468,7 @@
           <a:p>
             <a:fld id="{A8CEC974-71DF-4346-914E-9676B79374EF}" type="datetimeFigureOut">
               <a:rPr lang="tr-TR" smtClean="0"/>
-              <a:t>6.02.2026</a:t>
+              <a:t>8.02.2026</a:t>
             </a:fld>
             <a:endParaRPr lang="tr-TR"/>
           </a:p>
@@ -671,7 +676,7 @@
           <a:p>
             <a:fld id="{A8CEC974-71DF-4346-914E-9676B79374EF}" type="datetimeFigureOut">
               <a:rPr lang="tr-TR" smtClean="0"/>
-              <a:t>6.02.2026</a:t>
+              <a:t>8.02.2026</a:t>
             </a:fld>
             <a:endParaRPr lang="tr-TR"/>
           </a:p>
@@ -869,7 +874,7 @@
           <a:p>
             <a:fld id="{A8CEC974-71DF-4346-914E-9676B79374EF}" type="datetimeFigureOut">
               <a:rPr lang="tr-TR" smtClean="0"/>
-              <a:t>6.02.2026</a:t>
+              <a:t>8.02.2026</a:t>
             </a:fld>
             <a:endParaRPr lang="tr-TR"/>
           </a:p>
@@ -1144,7 +1149,7 @@
           <a:p>
             <a:fld id="{A8CEC974-71DF-4346-914E-9676B79374EF}" type="datetimeFigureOut">
               <a:rPr lang="tr-TR" smtClean="0"/>
-              <a:t>6.02.2026</a:t>
+              <a:t>8.02.2026</a:t>
             </a:fld>
             <a:endParaRPr lang="tr-TR"/>
           </a:p>
@@ -1409,7 +1414,7 @@
           <a:p>
             <a:fld id="{A8CEC974-71DF-4346-914E-9676B79374EF}" type="datetimeFigureOut">
               <a:rPr lang="tr-TR" smtClean="0"/>
-              <a:t>6.02.2026</a:t>
+              <a:t>8.02.2026</a:t>
             </a:fld>
             <a:endParaRPr lang="tr-TR"/>
           </a:p>
@@ -1821,7 +1826,7 @@
           <a:p>
             <a:fld id="{A8CEC974-71DF-4346-914E-9676B79374EF}" type="datetimeFigureOut">
               <a:rPr lang="tr-TR" smtClean="0"/>
-              <a:t>6.02.2026</a:t>
+              <a:t>8.02.2026</a:t>
             </a:fld>
             <a:endParaRPr lang="tr-TR"/>
           </a:p>
@@ -1962,7 +1967,7 @@
           <a:p>
             <a:fld id="{A8CEC974-71DF-4346-914E-9676B79374EF}" type="datetimeFigureOut">
               <a:rPr lang="tr-TR" smtClean="0"/>
-              <a:t>6.02.2026</a:t>
+              <a:t>8.02.2026</a:t>
             </a:fld>
             <a:endParaRPr lang="tr-TR"/>
           </a:p>
@@ -2075,7 +2080,7 @@
           <a:p>
             <a:fld id="{A8CEC974-71DF-4346-914E-9676B79374EF}" type="datetimeFigureOut">
               <a:rPr lang="tr-TR" smtClean="0"/>
-              <a:t>6.02.2026</a:t>
+              <a:t>8.02.2026</a:t>
             </a:fld>
             <a:endParaRPr lang="tr-TR"/>
           </a:p>
@@ -2386,7 +2391,7 @@
           <a:p>
             <a:fld id="{A8CEC974-71DF-4346-914E-9676B79374EF}" type="datetimeFigureOut">
               <a:rPr lang="tr-TR" smtClean="0"/>
-              <a:t>6.02.2026</a:t>
+              <a:t>8.02.2026</a:t>
             </a:fld>
             <a:endParaRPr lang="tr-TR"/>
           </a:p>
@@ -2674,7 +2679,7 @@
           <a:p>
             <a:fld id="{A8CEC974-71DF-4346-914E-9676B79374EF}" type="datetimeFigureOut">
               <a:rPr lang="tr-TR" smtClean="0"/>
-              <a:t>6.02.2026</a:t>
+              <a:t>8.02.2026</a:t>
             </a:fld>
             <a:endParaRPr lang="tr-TR"/>
           </a:p>
@@ -2915,7 +2920,7 @@
           <a:p>
             <a:fld id="{A8CEC974-71DF-4346-914E-9676B79374EF}" type="datetimeFigureOut">
               <a:rPr lang="tr-TR" smtClean="0"/>
-              <a:t>6.02.2026</a:t>
+              <a:t>8.02.2026</a:t>
             </a:fld>
             <a:endParaRPr lang="tr-TR"/>
           </a:p>
@@ -3334,86 +3339,6 @@
       </p:grpSpPr>
       <p:sp>
         <p:nvSpPr>
-          <p:cNvPr id="2" name="Başlık 1">
-            <a:extLst>
-              <a:ext uri="{FF2B5EF4-FFF2-40B4-BE49-F238E27FC236}">
-                <a16:creationId xmlns:a16="http://schemas.microsoft.com/office/drawing/2014/main" id="{AC461DE2-FBA9-D11A-03C5-9B36D638F0D5}"/>
-              </a:ext>
-            </a:extLst>
-          </p:cNvPr>
-          <p:cNvSpPr>
-            <a:spLocks noGrp="1"/>
-          </p:cNvSpPr>
-          <p:nvPr>
-            <p:ph type="ctrTitle"/>
-          </p:nvPr>
-        </p:nvSpPr>
-        <p:spPr/>
-        <p:txBody>
-          <a:bodyPr/>
-          <a:lstStyle/>
-          <a:p>
-            <a:endParaRPr lang="tr-TR"/>
-          </a:p>
-        </p:txBody>
-      </p:sp>
-      <p:sp>
-        <p:nvSpPr>
-          <p:cNvPr id="3" name="Alt Başlık 2">
-            <a:extLst>
-              <a:ext uri="{FF2B5EF4-FFF2-40B4-BE49-F238E27FC236}">
-                <a16:creationId xmlns:a16="http://schemas.microsoft.com/office/drawing/2014/main" id="{BEBA8D11-FE4A-7380-0CDA-24CFAD8A6734}"/>
-              </a:ext>
-            </a:extLst>
-          </p:cNvPr>
-          <p:cNvSpPr>
-            <a:spLocks noGrp="1"/>
-          </p:cNvSpPr>
-          <p:nvPr>
-            <p:ph type="subTitle" idx="1"/>
-          </p:nvPr>
-        </p:nvSpPr>
-        <p:spPr/>
-        <p:txBody>
-          <a:bodyPr/>
-          <a:lstStyle/>
-          <a:p>
-            <a:endParaRPr lang="tr-TR"/>
-          </a:p>
-        </p:txBody>
-      </p:sp>
-    </p:spTree>
-    <p:extLst>
-      <p:ext uri="{BB962C8B-B14F-4D97-AF65-F5344CB8AC3E}">
-        <p14:creationId xmlns:p14="http://schemas.microsoft.com/office/powerpoint/2010/main" val="2692094784"/>
-      </p:ext>
-    </p:extLst>
-  </p:cSld>
-  <p:clrMapOvr>
-    <a:masterClrMapping/>
-  </p:clrMapOvr>
-</p:sld>
-</file>
-
-<file path=ppt/slides/slide2.xml><?xml version="1.0" encoding="utf-8"?>
-<p:sld xmlns:a="http://schemas.openxmlformats.org/drawingml/2006/main" xmlns:r="http://schemas.openxmlformats.org/officeDocument/2006/relationships" xmlns:p="http://schemas.openxmlformats.org/presentationml/2006/main">
-  <p:cSld>
-    <p:spTree>
-      <p:nvGrpSpPr>
-        <p:cNvPr id="1" name=""/>
-        <p:cNvGrpSpPr/>
-        <p:nvPr/>
-      </p:nvGrpSpPr>
-      <p:grpSpPr>
-        <a:xfrm>
-          <a:off x="0" y="0"/>
-          <a:ext cx="0" cy="0"/>
-          <a:chOff x="0" y="0"/>
-          <a:chExt cx="0" cy="0"/>
-        </a:xfrm>
-      </p:grpSpPr>
-      <p:sp>
-        <p:nvSpPr>
           <p:cNvPr id="3" name="İçerik Yer Tutucusu 2">
             <a:extLst>
               <a:ext uri="{FF2B5EF4-FFF2-40B4-BE49-F238E27FC236}">
@@ -4609,7 +4534,205 @@
 </p:sld>
 </file>
 
-<file path=ppt/slides/slide3.xml><?xml version="1.0" encoding="utf-8"?>
+<file path=ppt/slides/slide10.xml><?xml version="1.0" encoding="utf-8"?>
+<p:sld xmlns:a="http://schemas.openxmlformats.org/drawingml/2006/main" xmlns:r="http://schemas.openxmlformats.org/officeDocument/2006/relationships" xmlns:p="http://schemas.openxmlformats.org/presentationml/2006/main">
+  <p:cSld>
+    <p:spTree>
+      <p:nvGrpSpPr>
+        <p:cNvPr id="1" name="">
+          <a:extLst>
+            <a:ext uri="{FF2B5EF4-FFF2-40B4-BE49-F238E27FC236}">
+              <a16:creationId xmlns:a16="http://schemas.microsoft.com/office/drawing/2014/main" id="{7A24271A-8583-FB3A-448F-4C4DCCD89A68}"/>
+            </a:ext>
+          </a:extLst>
+        </p:cNvPr>
+        <p:cNvGrpSpPr/>
+        <p:nvPr/>
+      </p:nvGrpSpPr>
+      <p:grpSpPr>
+        <a:xfrm>
+          <a:off x="0" y="0"/>
+          <a:ext cx="0" cy="0"/>
+          <a:chOff x="0" y="0"/>
+          <a:chExt cx="0" cy="0"/>
+        </a:xfrm>
+      </p:grpSpPr>
+      <p:sp>
+        <p:nvSpPr>
+          <p:cNvPr id="3" name="İçerik Yer Tutucusu 2">
+            <a:extLst>
+              <a:ext uri="{FF2B5EF4-FFF2-40B4-BE49-F238E27FC236}">
+                <a16:creationId xmlns:a16="http://schemas.microsoft.com/office/drawing/2014/main" id="{96F2E322-AA4C-04BA-46BA-1F0850E37DB2}"/>
+              </a:ext>
+            </a:extLst>
+          </p:cNvPr>
+          <p:cNvSpPr>
+            <a:spLocks noGrp="1"/>
+          </p:cNvSpPr>
+          <p:nvPr>
+            <p:ph idx="1"/>
+          </p:nvPr>
+        </p:nvSpPr>
+        <p:spPr>
+          <a:xfrm>
+            <a:off x="0" y="0"/>
+            <a:ext cx="12192000" cy="6858000"/>
+          </a:xfrm>
+        </p:spPr>
+        <p:txBody>
+          <a:bodyPr/>
+          <a:lstStyle/>
+          <a:p>
+            <a:endParaRPr lang="tr-TR" dirty="0"/>
+          </a:p>
+        </p:txBody>
+      </p:sp>
+    </p:spTree>
+    <p:extLst>
+      <p:ext uri="{BB962C8B-B14F-4D97-AF65-F5344CB8AC3E}">
+        <p14:creationId xmlns:p14="http://schemas.microsoft.com/office/powerpoint/2010/main" val="3053458916"/>
+      </p:ext>
+    </p:extLst>
+  </p:cSld>
+  <p:clrMapOvr>
+    <a:masterClrMapping/>
+  </p:clrMapOvr>
+</p:sld>
+</file>
+
+<file path=ppt/slides/slide11.xml><?xml version="1.0" encoding="utf-8"?>
+<p:sld xmlns:a="http://schemas.openxmlformats.org/drawingml/2006/main" xmlns:r="http://schemas.openxmlformats.org/officeDocument/2006/relationships" xmlns:p="http://schemas.openxmlformats.org/presentationml/2006/main">
+  <p:cSld>
+    <p:spTree>
+      <p:nvGrpSpPr>
+        <p:cNvPr id="1" name="">
+          <a:extLst>
+            <a:ext uri="{FF2B5EF4-FFF2-40B4-BE49-F238E27FC236}">
+              <a16:creationId xmlns:a16="http://schemas.microsoft.com/office/drawing/2014/main" id="{0BE57517-DC1C-6827-05C7-FE7BA6692149}"/>
+            </a:ext>
+          </a:extLst>
+        </p:cNvPr>
+        <p:cNvGrpSpPr/>
+        <p:nvPr/>
+      </p:nvGrpSpPr>
+      <p:grpSpPr>
+        <a:xfrm>
+          <a:off x="0" y="0"/>
+          <a:ext cx="0" cy="0"/>
+          <a:chOff x="0" y="0"/>
+          <a:chExt cx="0" cy="0"/>
+        </a:xfrm>
+      </p:grpSpPr>
+      <p:sp>
+        <p:nvSpPr>
+          <p:cNvPr id="3" name="İçerik Yer Tutucusu 2">
+            <a:extLst>
+              <a:ext uri="{FF2B5EF4-FFF2-40B4-BE49-F238E27FC236}">
+                <a16:creationId xmlns:a16="http://schemas.microsoft.com/office/drawing/2014/main" id="{905A7316-04DC-38FA-9822-518B73C05DAF}"/>
+              </a:ext>
+            </a:extLst>
+          </p:cNvPr>
+          <p:cNvSpPr>
+            <a:spLocks noGrp="1"/>
+          </p:cNvSpPr>
+          <p:nvPr>
+            <p:ph idx="1"/>
+          </p:nvPr>
+        </p:nvSpPr>
+        <p:spPr>
+          <a:xfrm>
+            <a:off x="0" y="0"/>
+            <a:ext cx="12192000" cy="6858000"/>
+          </a:xfrm>
+        </p:spPr>
+        <p:txBody>
+          <a:bodyPr/>
+          <a:lstStyle/>
+          <a:p>
+            <a:endParaRPr lang="tr-TR" dirty="0"/>
+          </a:p>
+        </p:txBody>
+      </p:sp>
+    </p:spTree>
+    <p:extLst>
+      <p:ext uri="{BB962C8B-B14F-4D97-AF65-F5344CB8AC3E}">
+        <p14:creationId xmlns:p14="http://schemas.microsoft.com/office/powerpoint/2010/main" val="314454653"/>
+      </p:ext>
+    </p:extLst>
+  </p:cSld>
+  <p:clrMapOvr>
+    <a:masterClrMapping/>
+  </p:clrMapOvr>
+</p:sld>
+</file>
+
+<file path=ppt/slides/slide12.xml><?xml version="1.0" encoding="utf-8"?>
+<p:sld xmlns:a="http://schemas.openxmlformats.org/drawingml/2006/main" xmlns:r="http://schemas.openxmlformats.org/officeDocument/2006/relationships" xmlns:p="http://schemas.openxmlformats.org/presentationml/2006/main">
+  <p:cSld>
+    <p:spTree>
+      <p:nvGrpSpPr>
+        <p:cNvPr id="1" name="">
+          <a:extLst>
+            <a:ext uri="{FF2B5EF4-FFF2-40B4-BE49-F238E27FC236}">
+              <a16:creationId xmlns:a16="http://schemas.microsoft.com/office/drawing/2014/main" id="{3E290A9B-3327-FA65-DB29-0A305359A874}"/>
+            </a:ext>
+          </a:extLst>
+        </p:cNvPr>
+        <p:cNvGrpSpPr/>
+        <p:nvPr/>
+      </p:nvGrpSpPr>
+      <p:grpSpPr>
+        <a:xfrm>
+          <a:off x="0" y="0"/>
+          <a:ext cx="0" cy="0"/>
+          <a:chOff x="0" y="0"/>
+          <a:chExt cx="0" cy="0"/>
+        </a:xfrm>
+      </p:grpSpPr>
+      <p:sp>
+        <p:nvSpPr>
+          <p:cNvPr id="3" name="İçerik Yer Tutucusu 2">
+            <a:extLst>
+              <a:ext uri="{FF2B5EF4-FFF2-40B4-BE49-F238E27FC236}">
+                <a16:creationId xmlns:a16="http://schemas.microsoft.com/office/drawing/2014/main" id="{1F595D74-0701-272E-7A2B-9193D4F7738F}"/>
+              </a:ext>
+            </a:extLst>
+          </p:cNvPr>
+          <p:cNvSpPr>
+            <a:spLocks noGrp="1"/>
+          </p:cNvSpPr>
+          <p:nvPr>
+            <p:ph idx="1"/>
+          </p:nvPr>
+        </p:nvSpPr>
+        <p:spPr>
+          <a:xfrm>
+            <a:off x="0" y="0"/>
+            <a:ext cx="12192000" cy="6858000"/>
+          </a:xfrm>
+        </p:spPr>
+        <p:txBody>
+          <a:bodyPr/>
+          <a:lstStyle/>
+          <a:p>
+            <a:endParaRPr lang="tr-TR" dirty="0"/>
+          </a:p>
+        </p:txBody>
+      </p:sp>
+    </p:spTree>
+    <p:extLst>
+      <p:ext uri="{BB962C8B-B14F-4D97-AF65-F5344CB8AC3E}">
+        <p14:creationId xmlns:p14="http://schemas.microsoft.com/office/powerpoint/2010/main" val="2197491109"/>
+      </p:ext>
+    </p:extLst>
+  </p:cSld>
+  <p:clrMapOvr>
+    <a:masterClrMapping/>
+  </p:clrMapOvr>
+</p:sld>
+</file>
+
+<file path=ppt/slides/slide2.xml><?xml version="1.0" encoding="utf-8"?>
 <p:sld xmlns:a="http://schemas.openxmlformats.org/drawingml/2006/main" xmlns:r="http://schemas.openxmlformats.org/officeDocument/2006/relationships" xmlns:p="http://schemas.openxmlformats.org/presentationml/2006/main">
   <p:cSld>
     <p:spTree>
@@ -6026,7 +6149,7 @@
 </p:sld>
 </file>
 
-<file path=ppt/slides/slide4.xml><?xml version="1.0" encoding="utf-8"?>
+<file path=ppt/slides/slide3.xml><?xml version="1.0" encoding="utf-8"?>
 <p:sld xmlns:a="http://schemas.openxmlformats.org/drawingml/2006/main" xmlns:r="http://schemas.openxmlformats.org/officeDocument/2006/relationships" xmlns:p="http://schemas.openxmlformats.org/presentationml/2006/main">
   <p:cSld>
     <p:spTree>
@@ -6337,576 +6460,6 @@
           </a:p>
         </p:txBody>
       </p:sp>
-    </p:spTree>
-    <p:extLst>
-      <p:ext uri="{BB962C8B-B14F-4D97-AF65-F5344CB8AC3E}">
-        <p14:creationId xmlns:p14="http://schemas.microsoft.com/office/powerpoint/2010/main" val="71401941"/>
-      </p:ext>
-    </p:extLst>
-  </p:cSld>
-  <p:clrMapOvr>
-    <a:masterClrMapping/>
-  </p:clrMapOvr>
-</p:sld>
-</file>
-
-<file path=ppt/slides/slide5.xml><?xml version="1.0" encoding="utf-8"?>
-<p:sld xmlns:a="http://schemas.openxmlformats.org/drawingml/2006/main" xmlns:r="http://schemas.openxmlformats.org/officeDocument/2006/relationships" xmlns:p="http://schemas.openxmlformats.org/presentationml/2006/main">
-  <p:cSld>
-    <p:spTree>
-      <p:nvGrpSpPr>
-        <p:cNvPr id="1" name=""/>
-        <p:cNvGrpSpPr/>
-        <p:nvPr/>
-      </p:nvGrpSpPr>
-      <p:grpSpPr>
-        <a:xfrm>
-          <a:off x="0" y="0"/>
-          <a:ext cx="0" cy="0"/>
-          <a:chOff x="0" y="0"/>
-          <a:chExt cx="0" cy="0"/>
-        </a:xfrm>
-      </p:grpSpPr>
-      <p:pic>
-        <p:nvPicPr>
-          <p:cNvPr id="13" name="Resim 12" descr="metin, sayı, numara, ekran görüntüsü, yazı tipi içeren bir resim&#10;&#10;Yapay zeka tarafından oluşturulmuş içerik yanlış olabilir.">
-            <a:extLst>
-              <a:ext uri="{FF2B5EF4-FFF2-40B4-BE49-F238E27FC236}">
-                <a16:creationId xmlns:a16="http://schemas.microsoft.com/office/drawing/2014/main" id="{3F4EC03A-90E6-07EC-C629-DE91B4ABADE4}"/>
-              </a:ext>
-            </a:extLst>
-          </p:cNvPr>
-          <p:cNvPicPr>
-            <a:picLocks noChangeAspect="1"/>
-          </p:cNvPicPr>
-          <p:nvPr/>
-        </p:nvPicPr>
-        <p:blipFill>
-          <a:blip r:embed="rId2"/>
-          <a:stretch>
-            <a:fillRect/>
-          </a:stretch>
-        </p:blipFill>
-        <p:spPr>
-          <a:xfrm>
-            <a:off x="966585" y="975713"/>
-            <a:ext cx="5877745" cy="1590897"/>
-          </a:xfrm>
-          <a:prstGeom prst="rect">
-            <a:avLst/>
-          </a:prstGeom>
-        </p:spPr>
-      </p:pic>
-      <p:sp>
-        <p:nvSpPr>
-          <p:cNvPr id="15" name="Metin kutusu 14">
-            <a:extLst>
-              <a:ext uri="{FF2B5EF4-FFF2-40B4-BE49-F238E27FC236}">
-                <a16:creationId xmlns:a16="http://schemas.microsoft.com/office/drawing/2014/main" id="{2BE12569-F6D0-8CE5-77D6-A61BC1416E76}"/>
-              </a:ext>
-            </a:extLst>
-          </p:cNvPr>
-          <p:cNvSpPr txBox="1"/>
-          <p:nvPr/>
-        </p:nvSpPr>
-        <p:spPr>
-          <a:xfrm>
-            <a:off x="8865022" y="2931320"/>
-            <a:ext cx="3188965" cy="369332"/>
-          </a:xfrm>
-          <a:prstGeom prst="rect">
-            <a:avLst/>
-          </a:prstGeom>
-          <a:noFill/>
-        </p:spPr>
-        <p:txBody>
-          <a:bodyPr wrap="square">
-            <a:spAutoFit/>
-          </a:bodyPr>
-          <a:lstStyle/>
-          <a:p>
-            <a:pPr>
-              <a:buFont typeface="Arial" panose="020B0604020202020204" pitchFamily="34" charset="0"/>
-              <a:buChar char="•"/>
-            </a:pPr>
-            <a:r>
-              <a:rPr lang="tr-TR" dirty="0"/>
-              <a:t>Technical </a:t>
-            </a:r>
-            <a:r>
-              <a:rPr lang="tr-TR" dirty="0" err="1"/>
-              <a:t>Settings</a:t>
-            </a:r>
-            <a:endParaRPr lang="tr-TR" dirty="0"/>
-          </a:p>
-        </p:txBody>
-      </p:sp>
-      <p:pic>
-        <p:nvPicPr>
-          <p:cNvPr id="17" name="Resim 16" descr="metin, sayı, numara, yazı tipi, yazılım içeren bir resim&#10;&#10;Yapay zeka tarafından oluşturulmuş içerik yanlış olabilir.">
-            <a:extLst>
-              <a:ext uri="{FF2B5EF4-FFF2-40B4-BE49-F238E27FC236}">
-                <a16:creationId xmlns:a16="http://schemas.microsoft.com/office/drawing/2014/main" id="{6BE5EE56-0E48-B06D-0D18-5131994B8E2C}"/>
-              </a:ext>
-            </a:extLst>
-          </p:cNvPr>
-          <p:cNvPicPr>
-            <a:picLocks noChangeAspect="1"/>
-          </p:cNvPicPr>
-          <p:nvPr/>
-        </p:nvPicPr>
-        <p:blipFill>
-          <a:blip r:embed="rId3"/>
-          <a:stretch>
-            <a:fillRect/>
-          </a:stretch>
-        </p:blipFill>
-        <p:spPr>
-          <a:xfrm>
-            <a:off x="966585" y="3300652"/>
-            <a:ext cx="6630325" cy="2581635"/>
-          </a:xfrm>
-          <a:prstGeom prst="rect">
-            <a:avLst/>
-          </a:prstGeom>
-        </p:spPr>
-      </p:pic>
-    </p:spTree>
-    <p:extLst>
-      <p:ext uri="{BB962C8B-B14F-4D97-AF65-F5344CB8AC3E}">
-        <p14:creationId xmlns:p14="http://schemas.microsoft.com/office/powerpoint/2010/main" val="3946779072"/>
-      </p:ext>
-    </p:extLst>
-  </p:cSld>
-  <p:clrMapOvr>
-    <a:masterClrMapping/>
-  </p:clrMapOvr>
-</p:sld>
-</file>
-
-<file path=ppt/slides/slide6.xml><?xml version="1.0" encoding="utf-8"?>
-<p:sld xmlns:a="http://schemas.openxmlformats.org/drawingml/2006/main" xmlns:r="http://schemas.openxmlformats.org/officeDocument/2006/relationships" xmlns:p="http://schemas.openxmlformats.org/presentationml/2006/main">
-  <p:cSld>
-    <p:spTree>
-      <p:nvGrpSpPr>
-        <p:cNvPr id="1" name=""/>
-        <p:cNvGrpSpPr/>
-        <p:nvPr/>
-      </p:nvGrpSpPr>
-      <p:grpSpPr>
-        <a:xfrm>
-          <a:off x="0" y="0"/>
-          <a:ext cx="0" cy="0"/>
-          <a:chOff x="0" y="0"/>
-          <a:chExt cx="0" cy="0"/>
-        </a:xfrm>
-      </p:grpSpPr>
-      <p:sp>
-        <p:nvSpPr>
-          <p:cNvPr id="5" name="Başlık 1">
-            <a:extLst>
-              <a:ext uri="{FF2B5EF4-FFF2-40B4-BE49-F238E27FC236}">
-                <a16:creationId xmlns:a16="http://schemas.microsoft.com/office/drawing/2014/main" id="{C26762EC-26CB-76B0-5188-184C2C31ACB4}"/>
-              </a:ext>
-            </a:extLst>
-          </p:cNvPr>
-          <p:cNvSpPr>
-            <a:spLocks noGrp="1"/>
-          </p:cNvSpPr>
-          <p:nvPr>
-            <p:ph idx="1"/>
-          </p:nvPr>
-        </p:nvSpPr>
-        <p:spPr>
-          <a:xfrm>
-            <a:off x="0" y="0"/>
-            <a:ext cx="12192000" cy="6858000"/>
-          </a:xfrm>
-        </p:spPr>
-        <p:txBody>
-          <a:bodyPr/>
-          <a:lstStyle/>
-          <a:p>
-            <a:pPr marL="3657600" lvl="8" indent="0">
-              <a:buNone/>
-            </a:pPr>
-            <a:r>
-              <a:rPr lang="tr-TR" sz="2400" b="1" dirty="0">
-                <a:solidFill>
-                  <a:srgbClr val="FF0000"/>
-                </a:solidFill>
-              </a:rPr>
-              <a:t>OPEN SQL KOMUTLARI</a:t>
-            </a:r>
-            <a:endParaRPr lang="tr-TR" b="1" dirty="0"/>
-          </a:p>
-          <a:p>
-            <a:r>
-              <a:rPr lang="tr-TR" sz="1800" b="1" dirty="0" err="1"/>
-              <a:t>Structure</a:t>
-            </a:r>
-            <a:r>
-              <a:rPr lang="tr-TR" sz="1800" dirty="0"/>
-              <a:t> → </a:t>
-            </a:r>
-            <a:r>
-              <a:rPr lang="tr-TR" sz="1800" b="1" dirty="0"/>
-              <a:t>Tek satır veri</a:t>
-            </a:r>
-            <a:r>
-              <a:rPr lang="tr-TR" sz="1800" dirty="0"/>
-              <a:t> tutar</a:t>
-            </a:r>
-            <a:br>
-              <a:rPr lang="tr-TR" sz="1800" dirty="0"/>
-            </a:br>
-            <a:r>
-              <a:rPr lang="tr-TR" sz="1800" dirty="0"/>
-              <a:t>(bir öğrencinin bilgisi gibi)</a:t>
-            </a:r>
-          </a:p>
-          <a:p>
-            <a:endParaRPr lang="tr-TR" sz="1800" dirty="0"/>
-          </a:p>
-          <a:p>
-            <a:r>
-              <a:rPr lang="tr-TR" sz="1800" b="1" dirty="0" err="1"/>
-              <a:t>Internal</a:t>
-            </a:r>
-            <a:r>
-              <a:rPr lang="tr-TR" sz="1800" b="1" dirty="0"/>
-              <a:t> </a:t>
-            </a:r>
-            <a:r>
-              <a:rPr lang="tr-TR" sz="1800" b="1" dirty="0" err="1"/>
-              <a:t>Table</a:t>
-            </a:r>
-            <a:r>
-              <a:rPr lang="tr-TR" sz="1800" b="1" dirty="0"/>
-              <a:t> (</a:t>
-            </a:r>
-            <a:r>
-              <a:rPr lang="tr-TR" sz="1800" b="1" dirty="0" err="1"/>
-              <a:t>table</a:t>
-            </a:r>
-            <a:r>
-              <a:rPr lang="tr-TR" sz="1800" b="1" dirty="0"/>
-              <a:t> </a:t>
-            </a:r>
-            <a:r>
-              <a:rPr lang="tr-TR" sz="1800" b="1" dirty="0" err="1"/>
-              <a:t>variable</a:t>
-            </a:r>
-            <a:r>
-              <a:rPr lang="tr-TR" sz="1800" b="1" dirty="0"/>
-              <a:t>)</a:t>
-            </a:r>
-            <a:r>
-              <a:rPr lang="tr-TR" sz="1800" dirty="0"/>
-              <a:t> → </a:t>
-            </a:r>
-            <a:r>
-              <a:rPr lang="tr-TR" sz="1800" b="1" dirty="0"/>
-              <a:t>Birden fazla </a:t>
-            </a:r>
-            <a:r>
-              <a:rPr lang="tr-TR" sz="1800" b="1" dirty="0" err="1"/>
-              <a:t>structure’un</a:t>
-            </a:r>
-            <a:r>
-              <a:rPr lang="tr-TR" sz="1800" b="1" dirty="0"/>
-              <a:t> listesi</a:t>
-            </a:r>
-            <a:br>
-              <a:rPr lang="tr-TR" sz="1800" dirty="0"/>
-            </a:br>
-            <a:r>
-              <a:rPr lang="tr-TR" sz="1800" dirty="0"/>
-              <a:t>(öğrenci listesi gibi)</a:t>
-            </a:r>
-          </a:p>
-          <a:p>
-            <a:endParaRPr lang="tr-TR" sz="1800" dirty="0"/>
-          </a:p>
-          <a:p>
-            <a:r>
-              <a:rPr lang="tr-TR" sz="1800" b="1" dirty="0"/>
-              <a:t>Database </a:t>
-            </a:r>
-            <a:r>
-              <a:rPr lang="tr-TR" sz="1800" b="1" dirty="0" err="1"/>
-              <a:t>Table</a:t>
-            </a:r>
-            <a:r>
-              <a:rPr lang="tr-TR" sz="1800" dirty="0"/>
-              <a:t> → </a:t>
-            </a:r>
-            <a:r>
-              <a:rPr lang="tr-TR" sz="1800" b="1" dirty="0"/>
-              <a:t>Verinin kalıcı olarak saklandığı yer</a:t>
-            </a:r>
-            <a:br>
-              <a:rPr lang="tr-TR" sz="1800" dirty="0"/>
-            </a:br>
-            <a:r>
-              <a:rPr lang="tr-TR" sz="1800" dirty="0"/>
-              <a:t>(SE11’de oluşturulur)</a:t>
-            </a:r>
-          </a:p>
-          <a:p>
-            <a:endParaRPr lang="tr-TR" sz="1800" dirty="0"/>
-          </a:p>
-          <a:p>
-            <a:r>
-              <a:rPr lang="tr-TR" sz="1800" dirty="0"/>
-              <a:t>İlişki:</a:t>
-            </a:r>
-          </a:p>
-          <a:p>
-            <a:pPr marL="0" indent="0">
-              <a:buNone/>
-            </a:pPr>
-            <a:r>
-              <a:rPr lang="tr-TR" sz="1800" dirty="0"/>
-              <a:t>   Database </a:t>
-            </a:r>
-            <a:r>
-              <a:rPr lang="tr-TR" sz="1800" dirty="0" err="1"/>
-              <a:t>Table</a:t>
-            </a:r>
-            <a:r>
-              <a:rPr lang="tr-TR" sz="1800" dirty="0"/>
-              <a:t> → </a:t>
-            </a:r>
-            <a:r>
-              <a:rPr lang="tr-TR" sz="1800" dirty="0" err="1"/>
-              <a:t>Internal</a:t>
-            </a:r>
-            <a:r>
-              <a:rPr lang="tr-TR" sz="1800" dirty="0"/>
-              <a:t> </a:t>
-            </a:r>
-            <a:r>
-              <a:rPr lang="tr-TR" sz="1800" dirty="0" err="1"/>
-              <a:t>Table</a:t>
-            </a:r>
-            <a:r>
-              <a:rPr lang="tr-TR" sz="1800" dirty="0"/>
-              <a:t> → </a:t>
-            </a:r>
-            <a:r>
-              <a:rPr lang="tr-TR" sz="1800" dirty="0" err="1"/>
-              <a:t>Structure</a:t>
-            </a:r>
-            <a:endParaRPr lang="tr-TR" sz="1800" dirty="0"/>
-          </a:p>
-          <a:p>
-            <a:pPr marL="0" indent="0">
-              <a:buNone/>
-            </a:pPr>
-            <a:endParaRPr lang="tr-TR" sz="1800" dirty="0"/>
-          </a:p>
-          <a:p>
-            <a:r>
-              <a:rPr lang="tr-TR" sz="1800" b="1" dirty="0" err="1"/>
-              <a:t>Structure</a:t>
-            </a:r>
-            <a:r>
-              <a:rPr lang="tr-TR" sz="1800" b="1" dirty="0"/>
-              <a:t> = 1 kayıt</a:t>
-            </a:r>
-            <a:r>
-              <a:rPr lang="tr-TR" sz="1800" dirty="0"/>
-              <a:t>, </a:t>
-            </a:r>
-            <a:r>
-              <a:rPr lang="tr-TR" sz="1800" b="1" dirty="0" err="1"/>
-              <a:t>Internal</a:t>
-            </a:r>
-            <a:r>
-              <a:rPr lang="tr-TR" sz="1800" b="1" dirty="0"/>
-              <a:t> </a:t>
-            </a:r>
-            <a:r>
-              <a:rPr lang="tr-TR" sz="1800" b="1" dirty="0" err="1"/>
-              <a:t>Table</a:t>
-            </a:r>
-            <a:r>
-              <a:rPr lang="tr-TR" sz="1800" b="1" dirty="0"/>
-              <a:t> = kayıtlar listesi</a:t>
-            </a:r>
-            <a:r>
-              <a:rPr lang="tr-TR" sz="1800" dirty="0"/>
-              <a:t>, </a:t>
-            </a:r>
-            <a:r>
-              <a:rPr lang="tr-TR" sz="1800" b="1" dirty="0"/>
-              <a:t>Database </a:t>
-            </a:r>
-            <a:r>
-              <a:rPr lang="tr-TR" sz="1800" b="1" dirty="0" err="1"/>
-              <a:t>Table</a:t>
-            </a:r>
-            <a:r>
-              <a:rPr lang="tr-TR" sz="1800" b="1" dirty="0"/>
-              <a:t> = </a:t>
-            </a:r>
-            <a:r>
-              <a:rPr lang="tr-TR" sz="1800" b="1" dirty="0" err="1"/>
-              <a:t>veritabanı</a:t>
-            </a:r>
-            <a:endParaRPr lang="tr-TR" sz="1800" dirty="0"/>
-          </a:p>
-          <a:p>
-            <a:endParaRPr lang="tr-TR" dirty="0"/>
-          </a:p>
-        </p:txBody>
-      </p:sp>
-    </p:spTree>
-    <p:extLst>
-      <p:ext uri="{BB962C8B-B14F-4D97-AF65-F5344CB8AC3E}">
-        <p14:creationId xmlns:p14="http://schemas.microsoft.com/office/powerpoint/2010/main" val="3457488644"/>
-      </p:ext>
-    </p:extLst>
-  </p:cSld>
-  <p:clrMapOvr>
-    <a:masterClrMapping/>
-  </p:clrMapOvr>
-</p:sld>
-</file>
-
-<file path=ppt/slides/slide7.xml><?xml version="1.0" encoding="utf-8"?>
-<p:sld xmlns:a="http://schemas.openxmlformats.org/drawingml/2006/main" xmlns:r="http://schemas.openxmlformats.org/officeDocument/2006/relationships" xmlns:p="http://schemas.openxmlformats.org/presentationml/2006/main">
-  <p:cSld>
-    <p:spTree>
-      <p:nvGrpSpPr>
-        <p:cNvPr id="1" name=""/>
-        <p:cNvGrpSpPr/>
-        <p:nvPr/>
-      </p:nvGrpSpPr>
-      <p:grpSpPr>
-        <a:xfrm>
-          <a:off x="0" y="0"/>
-          <a:ext cx="0" cy="0"/>
-          <a:chOff x="0" y="0"/>
-          <a:chExt cx="0" cy="0"/>
-        </a:xfrm>
-      </p:grpSpPr>
-      <p:sp>
-        <p:nvSpPr>
-          <p:cNvPr id="3" name="İçerik Yer Tutucusu 2">
-            <a:extLst>
-              <a:ext uri="{FF2B5EF4-FFF2-40B4-BE49-F238E27FC236}">
-                <a16:creationId xmlns:a16="http://schemas.microsoft.com/office/drawing/2014/main" id="{03E529CD-874D-80E2-849C-CE759925070A}"/>
-              </a:ext>
-            </a:extLst>
-          </p:cNvPr>
-          <p:cNvSpPr>
-            <a:spLocks noGrp="1"/>
-          </p:cNvSpPr>
-          <p:nvPr>
-            <p:ph idx="1"/>
-          </p:nvPr>
-        </p:nvSpPr>
-        <p:spPr>
-          <a:xfrm>
-            <a:off x="0" y="0"/>
-            <a:ext cx="12192000" cy="6858000"/>
-          </a:xfrm>
-        </p:spPr>
-        <p:txBody>
-          <a:bodyPr/>
-          <a:lstStyle/>
-          <a:p>
-            <a:pPr marL="0" indent="0">
-              <a:buNone/>
-            </a:pPr>
-            <a:r>
-              <a:rPr lang="tr-TR" b="1" dirty="0">
-                <a:solidFill>
-                  <a:srgbClr val="FF0000"/>
-                </a:solidFill>
-              </a:rPr>
-              <a:t>					</a:t>
-            </a:r>
-            <a:r>
-              <a:rPr lang="tr-TR" sz="2400" b="1" dirty="0">
-                <a:solidFill>
-                  <a:srgbClr val="FF0000"/>
-                </a:solidFill>
-              </a:rPr>
-              <a:t>PARAMETERS</a:t>
-            </a:r>
-            <a:endParaRPr lang="tr-TR" b="1" dirty="0">
-              <a:solidFill>
-                <a:srgbClr val="FF0000"/>
-              </a:solidFill>
-            </a:endParaRPr>
-          </a:p>
-          <a:p>
-            <a:pPr marL="0" indent="0">
-              <a:buNone/>
-            </a:pPr>
-            <a:r>
-              <a:rPr lang="tr-TR" sz="1800" dirty="0"/>
-              <a:t>Oluşturduğumuz giriş alanlarının metinlerini değiştirmek </a:t>
-            </a:r>
-            <a:r>
-              <a:rPr lang="tr-TR" sz="1800" dirty="0" err="1"/>
-              <a:t>için:Git</a:t>
-            </a:r>
-            <a:r>
-              <a:rPr lang="tr-TR" sz="1800" dirty="0"/>
-              <a:t>-&gt;Metin sembolü</a:t>
-            </a:r>
-          </a:p>
-          <a:p>
-            <a:pPr marL="0" indent="0">
-              <a:buNone/>
-            </a:pPr>
-            <a:r>
-              <a:rPr lang="tr-TR" sz="1800" dirty="0"/>
-              <a:t>Oluşturduğumuz </a:t>
-            </a:r>
-            <a:r>
-              <a:rPr lang="tr-TR" sz="1800" dirty="0" err="1"/>
-              <a:t>text</a:t>
-            </a:r>
-            <a:r>
-              <a:rPr lang="tr-TR" sz="1800" dirty="0"/>
-              <a:t> alanlarının metinlerini değiştirmek </a:t>
-            </a:r>
-            <a:r>
-              <a:rPr lang="tr-TR" sz="1800" dirty="0" err="1"/>
-              <a:t>için:Git</a:t>
-            </a:r>
-            <a:r>
-              <a:rPr lang="tr-TR" sz="1800" dirty="0"/>
-              <a:t>-&gt;</a:t>
-            </a:r>
-            <a:r>
-              <a:rPr lang="tr-TR" sz="1800" dirty="0" err="1"/>
-              <a:t>Text</a:t>
-            </a:r>
-            <a:r>
-              <a:rPr lang="tr-TR" sz="1800" dirty="0"/>
-              <a:t> sembolü</a:t>
-            </a:r>
-          </a:p>
-          <a:p>
-            <a:pPr marL="0" indent="0">
-              <a:buNone/>
-            </a:pPr>
-            <a:endParaRPr lang="tr-TR" sz="1800" dirty="0"/>
-          </a:p>
-          <a:p>
-            <a:pPr marL="0" indent="0">
-              <a:buNone/>
-            </a:pPr>
-            <a:endParaRPr lang="tr-TR" sz="1800" dirty="0"/>
-          </a:p>
-        </p:txBody>
-      </p:sp>
       <p:sp>
         <p:nvSpPr>
           <p:cNvPr id="7" name="Rectangle 4">
@@ -6923,8 +6476,8 @@
         </p:nvSpPr>
         <p:spPr bwMode="auto">
           <a:xfrm>
-            <a:off x="88490" y="1267965"/>
-            <a:ext cx="2387192" cy="1200329"/>
+            <a:off x="9458168" y="881133"/>
+            <a:ext cx="2387192" cy="923330"/>
           </a:xfrm>
           <a:prstGeom prst="rect">
             <a:avLst/>
@@ -7208,84 +6761,926 @@
               <a:latin typeface="Arial" panose="020B0604020202020204" pitchFamily="34" charset="0"/>
             </a:endParaRPr>
           </a:p>
-          <a:p>
-            <a:pPr marL="0" marR="0" lvl="0" indent="0" algn="l" defTabSz="914400" rtl="0" eaLnBrk="0" fontAlgn="base" latinLnBrk="0" hangingPunct="0">
-              <a:lnSpc>
-                <a:spcPct val="100000"/>
-              </a:lnSpc>
-              <a:spcBef>
-                <a:spcPct val="0"/>
-              </a:spcBef>
-              <a:spcAft>
-                <a:spcPct val="0"/>
-              </a:spcAft>
-              <a:buClrTx/>
-              <a:buSzTx/>
-              <a:buFontTx/>
+        </p:txBody>
+      </p:sp>
+    </p:spTree>
+    <p:extLst>
+      <p:ext uri="{BB962C8B-B14F-4D97-AF65-F5344CB8AC3E}">
+        <p14:creationId xmlns:p14="http://schemas.microsoft.com/office/powerpoint/2010/main" val="71401941"/>
+      </p:ext>
+    </p:extLst>
+  </p:cSld>
+  <p:clrMapOvr>
+    <a:masterClrMapping/>
+  </p:clrMapOvr>
+</p:sld>
+</file>
+
+<file path=ppt/slides/slide4.xml><?xml version="1.0" encoding="utf-8"?>
+<p:sld xmlns:a="http://schemas.openxmlformats.org/drawingml/2006/main" xmlns:r="http://schemas.openxmlformats.org/officeDocument/2006/relationships" xmlns:p="http://schemas.openxmlformats.org/presentationml/2006/main">
+  <p:cSld>
+    <p:spTree>
+      <p:nvGrpSpPr>
+        <p:cNvPr id="1" name=""/>
+        <p:cNvGrpSpPr/>
+        <p:nvPr/>
+      </p:nvGrpSpPr>
+      <p:grpSpPr>
+        <a:xfrm>
+          <a:off x="0" y="0"/>
+          <a:ext cx="0" cy="0"/>
+          <a:chOff x="0" y="0"/>
+          <a:chExt cx="0" cy="0"/>
+        </a:xfrm>
+      </p:grpSpPr>
+      <p:pic>
+        <p:nvPicPr>
+          <p:cNvPr id="13" name="Resim 12" descr="metin, sayı, numara, ekran görüntüsü, yazı tipi içeren bir resim&#10;&#10;Yapay zeka tarafından oluşturulmuş içerik yanlış olabilir.">
+            <a:extLst>
+              <a:ext uri="{FF2B5EF4-FFF2-40B4-BE49-F238E27FC236}">
+                <a16:creationId xmlns:a16="http://schemas.microsoft.com/office/drawing/2014/main" id="{3F4EC03A-90E6-07EC-C629-DE91B4ABADE4}"/>
+              </a:ext>
+            </a:extLst>
+          </p:cNvPr>
+          <p:cNvPicPr>
+            <a:picLocks noChangeAspect="1"/>
+          </p:cNvPicPr>
+          <p:nvPr/>
+        </p:nvPicPr>
+        <p:blipFill>
+          <a:blip r:embed="rId2"/>
+          <a:stretch>
+            <a:fillRect/>
+          </a:stretch>
+        </p:blipFill>
+        <p:spPr>
+          <a:xfrm>
+            <a:off x="966585" y="975713"/>
+            <a:ext cx="5877745" cy="1590897"/>
+          </a:xfrm>
+          <a:prstGeom prst="rect">
+            <a:avLst/>
+          </a:prstGeom>
+        </p:spPr>
+      </p:pic>
+      <p:sp>
+        <p:nvSpPr>
+          <p:cNvPr id="15" name="Metin kutusu 14">
+            <a:extLst>
+              <a:ext uri="{FF2B5EF4-FFF2-40B4-BE49-F238E27FC236}">
+                <a16:creationId xmlns:a16="http://schemas.microsoft.com/office/drawing/2014/main" id="{2BE12569-F6D0-8CE5-77D6-A61BC1416E76}"/>
+              </a:ext>
+            </a:extLst>
+          </p:cNvPr>
+          <p:cNvSpPr txBox="1"/>
+          <p:nvPr/>
+        </p:nvSpPr>
+        <p:spPr>
+          <a:xfrm>
+            <a:off x="8865022" y="2931320"/>
+            <a:ext cx="3188965" cy="369332"/>
+          </a:xfrm>
+          <a:prstGeom prst="rect">
+            <a:avLst/>
+          </a:prstGeom>
+          <a:noFill/>
+        </p:spPr>
+        <p:txBody>
+          <a:bodyPr wrap="square">
+            <a:spAutoFit/>
+          </a:bodyPr>
+          <a:lstStyle/>
+          <a:p>
+            <a:pPr>
+              <a:buFont typeface="Arial" panose="020B0604020202020204" pitchFamily="34" charset="0"/>
               <a:buChar char="•"/>
-              <a:tabLst/>
             </a:pPr>
             <a:r>
-              <a:rPr kumimoji="0" lang="tr-TR" altLang="tr-TR" sz="1000" b="0" i="0" u="none" strike="noStrike" cap="none" normalizeH="0" baseline="0" dirty="0">
-                <a:ln>
-                  <a:noFill/>
-                </a:ln>
+              <a:rPr lang="tr-TR" dirty="0"/>
+              <a:t>Technical </a:t>
+            </a:r>
+            <a:r>
+              <a:rPr lang="tr-TR" dirty="0" err="1"/>
+              <a:t>Settings</a:t>
+            </a:r>
+            <a:endParaRPr lang="tr-TR" dirty="0"/>
+          </a:p>
+        </p:txBody>
+      </p:sp>
+      <p:pic>
+        <p:nvPicPr>
+          <p:cNvPr id="17" name="Resim 16" descr="metin, sayı, numara, yazı tipi, yazılım içeren bir resim&#10;&#10;Yapay zeka tarafından oluşturulmuş içerik yanlış olabilir.">
+            <a:extLst>
+              <a:ext uri="{FF2B5EF4-FFF2-40B4-BE49-F238E27FC236}">
+                <a16:creationId xmlns:a16="http://schemas.microsoft.com/office/drawing/2014/main" id="{6BE5EE56-0E48-B06D-0D18-5131994B8E2C}"/>
+              </a:ext>
+            </a:extLst>
+          </p:cNvPr>
+          <p:cNvPicPr>
+            <a:picLocks noChangeAspect="1"/>
+          </p:cNvPicPr>
+          <p:nvPr/>
+        </p:nvPicPr>
+        <p:blipFill>
+          <a:blip r:embed="rId3"/>
+          <a:stretch>
+            <a:fillRect/>
+          </a:stretch>
+        </p:blipFill>
+        <p:spPr>
+          <a:xfrm>
+            <a:off x="966585" y="3300652"/>
+            <a:ext cx="6630325" cy="2581635"/>
+          </a:xfrm>
+          <a:prstGeom prst="rect">
+            <a:avLst/>
+          </a:prstGeom>
+        </p:spPr>
+      </p:pic>
+    </p:spTree>
+    <p:extLst>
+      <p:ext uri="{BB962C8B-B14F-4D97-AF65-F5344CB8AC3E}">
+        <p14:creationId xmlns:p14="http://schemas.microsoft.com/office/powerpoint/2010/main" val="3946779072"/>
+      </p:ext>
+    </p:extLst>
+  </p:cSld>
+  <p:clrMapOvr>
+    <a:masterClrMapping/>
+  </p:clrMapOvr>
+</p:sld>
+</file>
+
+<file path=ppt/slides/slide5.xml><?xml version="1.0" encoding="utf-8"?>
+<p:sld xmlns:a="http://schemas.openxmlformats.org/drawingml/2006/main" xmlns:r="http://schemas.openxmlformats.org/officeDocument/2006/relationships" xmlns:p="http://schemas.openxmlformats.org/presentationml/2006/main">
+  <p:cSld>
+    <p:spTree>
+      <p:nvGrpSpPr>
+        <p:cNvPr id="1" name=""/>
+        <p:cNvGrpSpPr/>
+        <p:nvPr/>
+      </p:nvGrpSpPr>
+      <p:grpSpPr>
+        <a:xfrm>
+          <a:off x="0" y="0"/>
+          <a:ext cx="0" cy="0"/>
+          <a:chOff x="0" y="0"/>
+          <a:chExt cx="0" cy="0"/>
+        </a:xfrm>
+      </p:grpSpPr>
+      <p:sp>
+        <p:nvSpPr>
+          <p:cNvPr id="5" name="Başlık 1">
+            <a:extLst>
+              <a:ext uri="{FF2B5EF4-FFF2-40B4-BE49-F238E27FC236}">
+                <a16:creationId xmlns:a16="http://schemas.microsoft.com/office/drawing/2014/main" id="{C26762EC-26CB-76B0-5188-184C2C31ACB4}"/>
+              </a:ext>
+            </a:extLst>
+          </p:cNvPr>
+          <p:cNvSpPr>
+            <a:spLocks noGrp="1"/>
+          </p:cNvSpPr>
+          <p:nvPr>
+            <p:ph idx="1"/>
+          </p:nvPr>
+        </p:nvSpPr>
+        <p:spPr>
+          <a:xfrm>
+            <a:off x="0" y="0"/>
+            <a:ext cx="12192000" cy="6858000"/>
+          </a:xfrm>
+        </p:spPr>
+        <p:txBody>
+          <a:bodyPr/>
+          <a:lstStyle/>
+          <a:p>
+            <a:pPr marL="3657600" lvl="8" indent="0">
+              <a:buNone/>
+            </a:pPr>
+            <a:r>
+              <a:rPr lang="tr-TR" sz="2400" b="1" dirty="0">
                 <a:solidFill>
-                  <a:schemeClr val="tx1"/>
+                  <a:srgbClr val="FF0000"/>
                 </a:solidFill>
-                <a:effectLst/>
-                <a:latin typeface="Arial Unicode MS"/>
               </a:rPr>
-              <a:t>" </a:t>
-            </a:r>
-            <a:r>
-              <a:rPr kumimoji="0" lang="tr-TR" altLang="tr-TR" sz="1000" b="0" i="0" u="none" strike="noStrike" cap="none" normalizeH="0" baseline="0" dirty="0" err="1">
-                <a:ln>
-                  <a:noFill/>
-                </a:ln>
+              <a:t>OPEN SQL KOMUTLARI</a:t>
+            </a:r>
+            <a:endParaRPr lang="tr-TR" b="1" dirty="0"/>
+          </a:p>
+          <a:p>
+            <a:r>
+              <a:rPr lang="tr-TR" sz="1800" b="1" dirty="0" err="1"/>
+              <a:t>Structure</a:t>
+            </a:r>
+            <a:r>
+              <a:rPr lang="tr-TR" sz="1800" dirty="0"/>
+              <a:t> → </a:t>
+            </a:r>
+            <a:r>
+              <a:rPr lang="tr-TR" sz="1800" b="1" dirty="0"/>
+              <a:t>Tek satır veri</a:t>
+            </a:r>
+            <a:r>
+              <a:rPr lang="tr-TR" sz="1800" dirty="0"/>
+              <a:t> tutar</a:t>
+            </a:r>
+            <a:br>
+              <a:rPr lang="tr-TR" sz="1800" dirty="0"/>
+            </a:br>
+            <a:r>
+              <a:rPr lang="tr-TR" sz="1800" dirty="0"/>
+              <a:t>(bir öğrencinin bilgisi gibi)</a:t>
+            </a:r>
+          </a:p>
+          <a:p>
+            <a:endParaRPr lang="tr-TR" sz="1800" dirty="0"/>
+          </a:p>
+          <a:p>
+            <a:r>
+              <a:rPr lang="tr-TR" sz="1800" b="1" dirty="0" err="1"/>
+              <a:t>Internal</a:t>
+            </a:r>
+            <a:r>
+              <a:rPr lang="tr-TR" sz="1800" b="1" dirty="0"/>
+              <a:t> </a:t>
+            </a:r>
+            <a:r>
+              <a:rPr lang="tr-TR" sz="1800" b="1" dirty="0" err="1"/>
+              <a:t>Table</a:t>
+            </a:r>
+            <a:r>
+              <a:rPr lang="tr-TR" sz="1800" b="1" dirty="0"/>
+              <a:t> (</a:t>
+            </a:r>
+            <a:r>
+              <a:rPr lang="tr-TR" sz="1800" b="1" dirty="0" err="1"/>
+              <a:t>table</a:t>
+            </a:r>
+            <a:r>
+              <a:rPr lang="tr-TR" sz="1800" b="1" dirty="0"/>
+              <a:t> </a:t>
+            </a:r>
+            <a:r>
+              <a:rPr lang="tr-TR" sz="1800" b="1" dirty="0" err="1"/>
+              <a:t>variable</a:t>
+            </a:r>
+            <a:r>
+              <a:rPr lang="tr-TR" sz="1800" b="1" dirty="0"/>
+              <a:t>)</a:t>
+            </a:r>
+            <a:r>
+              <a:rPr lang="tr-TR" sz="1800" dirty="0"/>
+              <a:t> → </a:t>
+            </a:r>
+            <a:r>
+              <a:rPr lang="tr-TR" sz="1800" b="1" dirty="0"/>
+              <a:t>Birden fazla </a:t>
+            </a:r>
+            <a:r>
+              <a:rPr lang="tr-TR" sz="1800" b="1" dirty="0" err="1"/>
+              <a:t>structure’un</a:t>
+            </a:r>
+            <a:r>
+              <a:rPr lang="tr-TR" sz="1800" b="1" dirty="0"/>
+              <a:t> listesi</a:t>
+            </a:r>
+            <a:br>
+              <a:rPr lang="tr-TR" sz="1800" dirty="0"/>
+            </a:br>
+            <a:r>
+              <a:rPr lang="tr-TR" sz="1800" dirty="0"/>
+              <a:t>(öğrenci listesi gibi)</a:t>
+            </a:r>
+          </a:p>
+          <a:p>
+            <a:endParaRPr lang="tr-TR" sz="1800" dirty="0"/>
+          </a:p>
+          <a:p>
+            <a:r>
+              <a:rPr lang="tr-TR" sz="1800" b="1" dirty="0"/>
+              <a:t>Database </a:t>
+            </a:r>
+            <a:r>
+              <a:rPr lang="tr-TR" sz="1800" b="1" dirty="0" err="1"/>
+              <a:t>Table</a:t>
+            </a:r>
+            <a:r>
+              <a:rPr lang="tr-TR" sz="1800" dirty="0"/>
+              <a:t> → </a:t>
+            </a:r>
+            <a:r>
+              <a:rPr lang="tr-TR" sz="1800" b="1" dirty="0"/>
+              <a:t>Verinin kalıcı olarak saklandığı yer</a:t>
+            </a:r>
+            <a:br>
+              <a:rPr lang="tr-TR" sz="1800" dirty="0"/>
+            </a:br>
+            <a:r>
+              <a:rPr lang="tr-TR" sz="1800" dirty="0"/>
+              <a:t>(SE11’de oluşturulur)</a:t>
+            </a:r>
+          </a:p>
+          <a:p>
+            <a:endParaRPr lang="tr-TR" sz="1800" dirty="0"/>
+          </a:p>
+          <a:p>
+            <a:r>
+              <a:rPr lang="tr-TR" sz="1800" dirty="0"/>
+              <a:t>İlişki:</a:t>
+            </a:r>
+          </a:p>
+          <a:p>
+            <a:pPr marL="0" indent="0">
+              <a:buNone/>
+            </a:pPr>
+            <a:r>
+              <a:rPr lang="tr-TR" sz="1800" dirty="0"/>
+              <a:t>   Database </a:t>
+            </a:r>
+            <a:r>
+              <a:rPr lang="tr-TR" sz="1800" dirty="0" err="1"/>
+              <a:t>Table</a:t>
+            </a:r>
+            <a:r>
+              <a:rPr lang="tr-TR" sz="1800" dirty="0"/>
+              <a:t> → </a:t>
+            </a:r>
+            <a:r>
+              <a:rPr lang="tr-TR" sz="1800" dirty="0" err="1"/>
+              <a:t>Internal</a:t>
+            </a:r>
+            <a:r>
+              <a:rPr lang="tr-TR" sz="1800" dirty="0"/>
+              <a:t> </a:t>
+            </a:r>
+            <a:r>
+              <a:rPr lang="tr-TR" sz="1800" dirty="0" err="1"/>
+              <a:t>Table</a:t>
+            </a:r>
+            <a:r>
+              <a:rPr lang="tr-TR" sz="1800" dirty="0"/>
+              <a:t> → </a:t>
+            </a:r>
+            <a:r>
+              <a:rPr lang="tr-TR" sz="1800" dirty="0" err="1"/>
+              <a:t>Structure</a:t>
+            </a:r>
+            <a:endParaRPr lang="tr-TR" sz="1800" dirty="0"/>
+          </a:p>
+          <a:p>
+            <a:pPr marL="0" indent="0">
+              <a:buNone/>
+            </a:pPr>
+            <a:endParaRPr lang="tr-TR" sz="1800" dirty="0"/>
+          </a:p>
+          <a:p>
+            <a:r>
+              <a:rPr lang="tr-TR" sz="1800" b="1" dirty="0" err="1"/>
+              <a:t>Structure</a:t>
+            </a:r>
+            <a:r>
+              <a:rPr lang="tr-TR" sz="1800" b="1" dirty="0"/>
+              <a:t> = 1 kayıt</a:t>
+            </a:r>
+            <a:r>
+              <a:rPr lang="tr-TR" sz="1800" dirty="0"/>
+              <a:t>, </a:t>
+            </a:r>
+            <a:r>
+              <a:rPr lang="tr-TR" sz="1800" b="1" dirty="0" err="1"/>
+              <a:t>Internal</a:t>
+            </a:r>
+            <a:r>
+              <a:rPr lang="tr-TR" sz="1800" b="1" dirty="0"/>
+              <a:t> </a:t>
+            </a:r>
+            <a:r>
+              <a:rPr lang="tr-TR" sz="1800" b="1" dirty="0" err="1"/>
+              <a:t>Table</a:t>
+            </a:r>
+            <a:r>
+              <a:rPr lang="tr-TR" sz="1800" b="1" dirty="0"/>
+              <a:t> = kayıtlar listesi</a:t>
+            </a:r>
+            <a:r>
+              <a:rPr lang="tr-TR" sz="1800" dirty="0"/>
+              <a:t>, </a:t>
+            </a:r>
+            <a:r>
+              <a:rPr lang="tr-TR" sz="1800" b="1" dirty="0"/>
+              <a:t>Database </a:t>
+            </a:r>
+            <a:r>
+              <a:rPr lang="tr-TR" sz="1800" b="1" dirty="0" err="1"/>
+              <a:t>Table</a:t>
+            </a:r>
+            <a:r>
+              <a:rPr lang="tr-TR" sz="1800" b="1" dirty="0"/>
+              <a:t> = </a:t>
+            </a:r>
+            <a:r>
+              <a:rPr lang="tr-TR" sz="1800" b="1" dirty="0" err="1"/>
+              <a:t>veritabanı</a:t>
+            </a:r>
+            <a:endParaRPr lang="tr-TR" sz="1800" dirty="0"/>
+          </a:p>
+          <a:p>
+            <a:endParaRPr lang="tr-TR" dirty="0"/>
+          </a:p>
+        </p:txBody>
+      </p:sp>
+    </p:spTree>
+    <p:extLst>
+      <p:ext uri="{BB962C8B-B14F-4D97-AF65-F5344CB8AC3E}">
+        <p14:creationId xmlns:p14="http://schemas.microsoft.com/office/powerpoint/2010/main" val="3457488644"/>
+      </p:ext>
+    </p:extLst>
+  </p:cSld>
+  <p:clrMapOvr>
+    <a:masterClrMapping/>
+  </p:clrMapOvr>
+</p:sld>
+</file>
+
+<file path=ppt/slides/slide6.xml><?xml version="1.0" encoding="utf-8"?>
+<p:sld xmlns:a="http://schemas.openxmlformats.org/drawingml/2006/main" xmlns:r="http://schemas.openxmlformats.org/officeDocument/2006/relationships" xmlns:p="http://schemas.openxmlformats.org/presentationml/2006/main">
+  <p:cSld>
+    <p:spTree>
+      <p:nvGrpSpPr>
+        <p:cNvPr id="1" name=""/>
+        <p:cNvGrpSpPr/>
+        <p:nvPr/>
+      </p:nvGrpSpPr>
+      <p:grpSpPr>
+        <a:xfrm>
+          <a:off x="0" y="0"/>
+          <a:ext cx="0" cy="0"/>
+          <a:chOff x="0" y="0"/>
+          <a:chExt cx="0" cy="0"/>
+        </a:xfrm>
+      </p:grpSpPr>
+      <p:sp>
+        <p:nvSpPr>
+          <p:cNvPr id="3" name="İçerik Yer Tutucusu 2">
+            <a:extLst>
+              <a:ext uri="{FF2B5EF4-FFF2-40B4-BE49-F238E27FC236}">
+                <a16:creationId xmlns:a16="http://schemas.microsoft.com/office/drawing/2014/main" id="{03E529CD-874D-80E2-849C-CE759925070A}"/>
+              </a:ext>
+            </a:extLst>
+          </p:cNvPr>
+          <p:cNvSpPr>
+            <a:spLocks noGrp="1"/>
+          </p:cNvSpPr>
+          <p:nvPr>
+            <p:ph idx="1"/>
+          </p:nvPr>
+        </p:nvSpPr>
+        <p:spPr>
+          <a:xfrm>
+            <a:off x="0" y="0"/>
+            <a:ext cx="12192000" cy="6858000"/>
+          </a:xfrm>
+        </p:spPr>
+        <p:txBody>
+          <a:bodyPr/>
+          <a:lstStyle/>
+          <a:p>
+            <a:pPr marL="0" indent="0">
+              <a:buNone/>
+            </a:pPr>
+            <a:r>
+              <a:rPr lang="tr-TR" b="1" dirty="0">
                 <a:solidFill>
-                  <a:schemeClr val="tx1"/>
+                  <a:srgbClr val="FF0000"/>
                 </a:solidFill>
-                <a:effectLst/>
-                <a:latin typeface="Arial Unicode MS"/>
               </a:rPr>
+              <a:t>					</a:t>
+            </a:r>
+            <a:r>
+              <a:rPr lang="tr-TR" sz="2400" b="1" dirty="0">
+                <a:solidFill>
+                  <a:srgbClr val="FF0000"/>
+                </a:solidFill>
+              </a:rPr>
+              <a:t>PARAMETERS</a:t>
+            </a:r>
+            <a:endParaRPr lang="tr-TR" b="1" dirty="0">
+              <a:solidFill>
+                <a:srgbClr val="FF0000"/>
+              </a:solidFill>
+            </a:endParaRPr>
+          </a:p>
+          <a:p>
+            <a:pPr marL="0" indent="0">
+              <a:buNone/>
+            </a:pPr>
+            <a:r>
+              <a:rPr lang="tr-TR" sz="1800" dirty="0"/>
+              <a:t>Oluşturduğumuz giriş alanlarının metinlerini değiştirmek </a:t>
+            </a:r>
+            <a:r>
+              <a:rPr lang="tr-TR" sz="1800" dirty="0" err="1"/>
+              <a:t>için:Git</a:t>
+            </a:r>
+            <a:r>
+              <a:rPr lang="tr-TR" sz="1800" dirty="0"/>
+              <a:t>-&gt;Metin sembolü</a:t>
+            </a:r>
+          </a:p>
+          <a:p>
+            <a:pPr marL="0" indent="0">
+              <a:buNone/>
+            </a:pPr>
+            <a:r>
+              <a:rPr lang="tr-TR" sz="1800" dirty="0"/>
+              <a:t>Oluşturduğumuz </a:t>
+            </a:r>
+            <a:r>
+              <a:rPr lang="tr-TR" sz="1800" dirty="0" err="1"/>
               <a:t>text</a:t>
             </a:r>
             <a:r>
-              <a:rPr kumimoji="0" lang="tr-TR" altLang="tr-TR" sz="800" b="0" i="0" u="none" strike="noStrike" cap="none" normalizeH="0" baseline="0" dirty="0">
-                <a:ln>
-                  <a:noFill/>
-                </a:ln>
+              <a:rPr lang="tr-TR" sz="1800" dirty="0"/>
+              <a:t> alanlarının metinlerini değiştirmek </a:t>
+            </a:r>
+            <a:r>
+              <a:rPr lang="tr-TR" sz="1800" dirty="0" err="1"/>
+              <a:t>için:Git</a:t>
+            </a:r>
+            <a:r>
+              <a:rPr lang="tr-TR" sz="1800" dirty="0"/>
+              <a:t>-&gt;</a:t>
+            </a:r>
+            <a:r>
+              <a:rPr lang="tr-TR" sz="1800" dirty="0" err="1"/>
+              <a:t>Text</a:t>
+            </a:r>
+            <a:r>
+              <a:rPr lang="tr-TR" sz="1800" dirty="0"/>
+              <a:t> sembolü</a:t>
+            </a:r>
+          </a:p>
+          <a:p>
+            <a:pPr marL="0" indent="0">
+              <a:buNone/>
+            </a:pPr>
+            <a:r>
+              <a:rPr lang="tr-TR" sz="1800" dirty="0"/>
+              <a:t>				</a:t>
+            </a:r>
+          </a:p>
+          <a:p>
+            <a:pPr marL="0" indent="0">
+              <a:buNone/>
+            </a:pPr>
+            <a:endParaRPr lang="tr-TR" sz="1800" dirty="0"/>
+          </a:p>
+          <a:p>
+            <a:pPr marL="0" indent="0">
+              <a:buNone/>
+            </a:pPr>
+            <a:r>
+              <a:rPr lang="tr-TR" sz="1800" dirty="0"/>
+              <a:t>					</a:t>
+            </a:r>
+            <a:r>
+              <a:rPr lang="tr-TR" sz="2400" b="1" dirty="0">
                 <a:solidFill>
-                  <a:schemeClr val="tx1"/>
+                  <a:srgbClr val="FF0000"/>
                 </a:solidFill>
-                <a:effectLst/>
               </a:rPr>
-              <a:t> → </a:t>
-            </a:r>
-            <a:r>
-              <a:rPr kumimoji="0" lang="tr-TR" altLang="tr-TR" sz="1800" b="1" i="0" u="none" strike="noStrike" cap="none" normalizeH="0" baseline="0" dirty="0">
-                <a:ln>
-                  <a:noFill/>
-                </a:ln>
-                <a:solidFill>
-                  <a:schemeClr val="tx1"/>
-                </a:solidFill>
-                <a:effectLst/>
-                <a:latin typeface="Arial" panose="020B0604020202020204" pitchFamily="34" charset="0"/>
+              <a:t>EVENTS</a:t>
+            </a:r>
+          </a:p>
+          <a:p>
+            <a:pPr marL="0" indent="0">
+              <a:buNone/>
+            </a:pPr>
+            <a:endParaRPr lang="tr-TR" sz="1800" dirty="0"/>
+          </a:p>
+        </p:txBody>
+      </p:sp>
+      <p:sp>
+        <p:nvSpPr>
+          <p:cNvPr id="4" name="Metin kutusu 3">
+            <a:extLst>
+              <a:ext uri="{FF2B5EF4-FFF2-40B4-BE49-F238E27FC236}">
+                <a16:creationId xmlns:a16="http://schemas.microsoft.com/office/drawing/2014/main" id="{BBD82215-53F7-E37E-5653-D3926740A996}"/>
+              </a:ext>
+            </a:extLst>
+          </p:cNvPr>
+          <p:cNvSpPr txBox="1"/>
+          <p:nvPr/>
+        </p:nvSpPr>
+        <p:spPr>
+          <a:xfrm>
+            <a:off x="58993" y="2382992"/>
+            <a:ext cx="12074013" cy="5078313"/>
+          </a:xfrm>
+          <a:prstGeom prst="rect">
+            <a:avLst/>
+          </a:prstGeom>
+          <a:noFill/>
+        </p:spPr>
+        <p:txBody>
+          <a:bodyPr wrap="square">
+            <a:spAutoFit/>
+          </a:bodyPr>
+          <a:lstStyle/>
+          <a:p>
+            <a:pPr>
+              <a:buNone/>
+            </a:pPr>
+            <a:r>
+              <a:rPr lang="tr-TR" dirty="0" err="1"/>
+              <a:t>ABAP’te</a:t>
+            </a:r>
+            <a:r>
+              <a:rPr lang="tr-TR" dirty="0"/>
+              <a:t> </a:t>
+            </a:r>
+            <a:r>
+              <a:rPr lang="tr-TR" b="1" dirty="0" err="1"/>
+              <a:t>event’ler</a:t>
+            </a:r>
+            <a:r>
+              <a:rPr lang="tr-TR" dirty="0"/>
+              <a:t>, programın </a:t>
+            </a:r>
+            <a:r>
+              <a:rPr lang="tr-TR" b="1" dirty="0"/>
+              <a:t>hangi aşamada ne çalışacağını belirleyen tetikleyicilerdir:</a:t>
+            </a:r>
+            <a:endParaRPr lang="tr-TR" dirty="0"/>
+          </a:p>
+          <a:p>
+            <a:pPr marL="285750" indent="-285750">
+              <a:buFont typeface="Arial" panose="020B0604020202020204" pitchFamily="34" charset="0"/>
+              <a:buChar char="•"/>
+            </a:pPr>
+            <a:r>
+              <a:rPr lang="tr-TR" dirty="0"/>
+              <a:t>Program açıldığında </a:t>
+            </a:r>
+            <a:r>
+              <a:rPr lang="tr-TR" dirty="0">
+                <a:latin typeface="Courier New" panose="02070309020205020404" pitchFamily="49" charset="0"/>
               </a:rPr>
-              <a:t>yorum</a:t>
-            </a:r>
-            <a:endParaRPr kumimoji="0" lang="tr-TR" altLang="tr-TR" sz="1800" b="0" i="0" u="none" strike="noStrike" cap="none" normalizeH="0" baseline="0" dirty="0">
-              <a:ln>
-                <a:noFill/>
-              </a:ln>
-              <a:solidFill>
-                <a:schemeClr val="tx1"/>
-              </a:solidFill>
-              <a:effectLst/>
-              <a:latin typeface="Arial" panose="020B0604020202020204" pitchFamily="34" charset="0"/>
-            </a:endParaRPr>
+              <a:t>INITIALIZATION</a:t>
+            </a:r>
+            <a:r>
+              <a:rPr lang="tr-TR" dirty="0"/>
+              <a:t> çalışır ve varsayılan değerler atanır.</a:t>
+            </a:r>
+          </a:p>
+          <a:p>
+            <a:pPr marL="285750" indent="-285750">
+              <a:buFont typeface="Arial" panose="020B0604020202020204" pitchFamily="34" charset="0"/>
+              <a:buChar char="•"/>
+            </a:pPr>
+            <a:r>
+              <a:rPr lang="tr-TR" dirty="0"/>
+              <a:t>Kullanıcı ekrandayken ve çalıştırmadan önce kontroller için </a:t>
+            </a:r>
+            <a:r>
+              <a:rPr lang="tr-TR" dirty="0">
+                <a:latin typeface="Courier New" panose="02070309020205020404" pitchFamily="49" charset="0"/>
+              </a:rPr>
+              <a:t>AT SELECTION-SCREEN</a:t>
+            </a:r>
+            <a:r>
+              <a:rPr lang="tr-TR" dirty="0"/>
+              <a:t> devreye </a:t>
+            </a:r>
+            <a:r>
+              <a:rPr lang="tr-TR" dirty="0" err="1"/>
+              <a:t>girer.Ekran</a:t>
+            </a:r>
+            <a:r>
+              <a:rPr lang="tr-TR" dirty="0"/>
+              <a:t> çizilirken.</a:t>
+            </a:r>
+          </a:p>
+          <a:p>
+            <a:pPr marL="285750" indent="-285750">
+              <a:buFont typeface="Arial" panose="020B0604020202020204" pitchFamily="34" charset="0"/>
+              <a:buChar char="•"/>
+            </a:pPr>
+            <a:r>
+              <a:rPr lang="tr-TR" dirty="0"/>
+              <a:t>Kullanıcı </a:t>
+            </a:r>
+            <a:r>
+              <a:rPr lang="tr-TR" b="1" dirty="0"/>
+              <a:t>F8 (</a:t>
+            </a:r>
+            <a:r>
+              <a:rPr lang="tr-TR" b="1" dirty="0" err="1"/>
+              <a:t>Execute</a:t>
+            </a:r>
+            <a:r>
+              <a:rPr lang="tr-TR" b="1" dirty="0"/>
+              <a:t>)</a:t>
+            </a:r>
+            <a:r>
+              <a:rPr lang="tr-TR" dirty="0"/>
+              <a:t> bastığında asıl iş mantığının yazıldığı </a:t>
+            </a:r>
+            <a:r>
+              <a:rPr lang="tr-TR" dirty="0">
+                <a:latin typeface="Courier New" panose="02070309020205020404" pitchFamily="49" charset="0"/>
+              </a:rPr>
+              <a:t>START-OF-SELECTION</a:t>
+            </a:r>
+            <a:r>
+              <a:rPr lang="tr-TR" dirty="0"/>
+              <a:t> </a:t>
+            </a:r>
+            <a:r>
+              <a:rPr lang="tr-TR" dirty="0" err="1"/>
+              <a:t>çalışır.Kullanıcı</a:t>
+            </a:r>
+            <a:r>
+              <a:rPr lang="tr-TR" dirty="0"/>
+              <a:t> </a:t>
+            </a:r>
+            <a:r>
+              <a:rPr lang="tr-TR" dirty="0" err="1"/>
+              <a:t>ENTER’a</a:t>
+            </a:r>
+            <a:r>
+              <a:rPr lang="tr-TR" dirty="0"/>
+              <a:t> basınca.</a:t>
+            </a:r>
+          </a:p>
+          <a:p>
+            <a:pPr marL="285750" indent="-285750">
+              <a:buFont typeface="Arial" panose="020B0604020202020204" pitchFamily="34" charset="0"/>
+              <a:buChar char="•"/>
+            </a:pPr>
+            <a:r>
+              <a:rPr lang="tr-TR" dirty="0"/>
+              <a:t>Ana işlem bittikten sonra son düzenlemeler için </a:t>
+            </a:r>
+            <a:r>
+              <a:rPr lang="tr-TR" dirty="0">
+                <a:latin typeface="Courier New" panose="02070309020205020404" pitchFamily="49" charset="0"/>
+              </a:rPr>
+              <a:t>END-OF-SELECTION</a:t>
+            </a:r>
+            <a:r>
+              <a:rPr lang="tr-TR" dirty="0"/>
+              <a:t> kullanılır.</a:t>
+            </a:r>
+          </a:p>
+          <a:p>
+            <a:pPr marL="285750" indent="-285750">
+              <a:buFont typeface="Arial" panose="020B0604020202020204" pitchFamily="34" charset="0"/>
+              <a:buChar char="•"/>
+            </a:pPr>
+            <a:r>
+              <a:rPr lang="tr-TR" dirty="0"/>
+              <a:t>Listede bir satıra çift tıklanırsa </a:t>
+            </a:r>
+            <a:r>
+              <a:rPr lang="tr-TR" dirty="0">
+                <a:latin typeface="Courier New" panose="02070309020205020404" pitchFamily="49" charset="0"/>
+              </a:rPr>
+              <a:t>AT LINE-SELECTION</a:t>
+            </a:r>
+            <a:r>
+              <a:rPr lang="tr-TR" dirty="0"/>
+              <a:t> tetiklenir.</a:t>
+            </a:r>
+          </a:p>
+          <a:p>
+            <a:pPr marL="285750" indent="-285750">
+              <a:buFont typeface="Arial" panose="020B0604020202020204" pitchFamily="34" charset="0"/>
+              <a:buChar char="•"/>
+            </a:pPr>
+            <a:endParaRPr lang="tr-TR" dirty="0"/>
+          </a:p>
+          <a:p>
+            <a:pPr>
+              <a:buNone/>
+            </a:pPr>
+            <a:r>
+              <a:rPr lang="tr-TR" dirty="0"/>
+              <a:t>Kısacası </a:t>
+            </a:r>
+            <a:r>
+              <a:rPr lang="tr-TR" dirty="0" err="1"/>
+              <a:t>event’ler</a:t>
+            </a:r>
+            <a:r>
+              <a:rPr lang="tr-TR" dirty="0"/>
+              <a:t>, ABAP programının akışını adım adım yöneten yapılardır.</a:t>
+            </a:r>
+          </a:p>
+          <a:p>
+            <a:pPr>
+              <a:buNone/>
+            </a:pPr>
+            <a:endParaRPr lang="tr-TR" dirty="0"/>
+          </a:p>
+          <a:p>
+            <a:pPr>
+              <a:buNone/>
+            </a:pPr>
+            <a:r>
+              <a:rPr lang="tr-TR" dirty="0" err="1"/>
+              <a:t>Abap</a:t>
+            </a:r>
+            <a:r>
+              <a:rPr lang="tr-TR" dirty="0"/>
+              <a:t> mantığında () veya TAB mantığı yok sonraki </a:t>
+            </a:r>
+            <a:r>
+              <a:rPr lang="tr-TR" dirty="0" err="1"/>
+              <a:t>keyworde</a:t>
+            </a:r>
+            <a:r>
+              <a:rPr lang="tr-TR" dirty="0"/>
+              <a:t> kadar işlemler </a:t>
+            </a:r>
+            <a:r>
+              <a:rPr lang="tr-TR" dirty="0" err="1"/>
+              <a:t>yapılır.Scope</a:t>
+            </a:r>
+            <a:r>
+              <a:rPr lang="tr-TR" dirty="0"/>
+              <a:t> </a:t>
+            </a:r>
+            <a:r>
+              <a:rPr lang="tr-TR" dirty="0" err="1"/>
+              <a:t>keywordlerle</a:t>
+            </a:r>
+            <a:r>
+              <a:rPr lang="tr-TR" dirty="0"/>
+              <a:t> sağlanır.</a:t>
+            </a:r>
+          </a:p>
+          <a:p>
+            <a:pPr>
+              <a:buNone/>
+            </a:pPr>
+            <a:endParaRPr lang="tr-TR" dirty="0"/>
+          </a:p>
+          <a:p>
+            <a:pPr>
+              <a:buNone/>
+            </a:pPr>
+            <a:endParaRPr lang="tr-TR" dirty="0"/>
+          </a:p>
+          <a:p>
+            <a:pPr>
+              <a:buNone/>
+            </a:pPr>
+            <a:endParaRPr lang="tr-TR" dirty="0"/>
+          </a:p>
+          <a:p>
+            <a:pPr>
+              <a:buNone/>
+            </a:pPr>
+            <a:r>
+              <a:rPr lang="tr-TR" dirty="0" err="1"/>
+              <a:t>Global,local</a:t>
+            </a:r>
+            <a:r>
+              <a:rPr lang="tr-TR" dirty="0"/>
+              <a:t>-&gt;Global her </a:t>
+            </a:r>
+            <a:r>
+              <a:rPr lang="tr-TR" dirty="0" err="1"/>
+              <a:t>yerde,local</a:t>
+            </a:r>
+            <a:r>
+              <a:rPr lang="tr-TR" dirty="0"/>
+              <a:t> ise form içinde kullanılabilir.</a:t>
+            </a:r>
+          </a:p>
+          <a:p>
+            <a:pPr>
+              <a:buNone/>
+            </a:pPr>
+            <a:endParaRPr lang="tr-TR" dirty="0"/>
+          </a:p>
+          <a:p>
+            <a:pPr>
+              <a:buNone/>
+            </a:pPr>
+            <a:endParaRPr lang="tr-TR" dirty="0"/>
+          </a:p>
+          <a:p>
+            <a:pPr>
+              <a:buNone/>
+            </a:pPr>
+            <a:endParaRPr lang="tr-TR" dirty="0"/>
+          </a:p>
+          <a:p>
+            <a:pPr>
+              <a:buNone/>
+            </a:pPr>
+            <a:endParaRPr lang="tr-TR" dirty="0"/>
           </a:p>
         </p:txBody>
       </p:sp>
@@ -7293,6 +7688,879 @@
     <p:extLst>
       <p:ext uri="{BB962C8B-B14F-4D97-AF65-F5344CB8AC3E}">
         <p14:creationId xmlns:p14="http://schemas.microsoft.com/office/powerpoint/2010/main" val="3895145125"/>
+      </p:ext>
+    </p:extLst>
+  </p:cSld>
+  <p:clrMapOvr>
+    <a:masterClrMapping/>
+  </p:clrMapOvr>
+</p:sld>
+</file>
+
+<file path=ppt/slides/slide7.xml><?xml version="1.0" encoding="utf-8"?>
+<p:sld xmlns:a="http://schemas.openxmlformats.org/drawingml/2006/main" xmlns:r="http://schemas.openxmlformats.org/officeDocument/2006/relationships" xmlns:p="http://schemas.openxmlformats.org/presentationml/2006/main">
+  <p:cSld>
+    <p:spTree>
+      <p:nvGrpSpPr>
+        <p:cNvPr id="1" name=""/>
+        <p:cNvGrpSpPr/>
+        <p:nvPr/>
+      </p:nvGrpSpPr>
+      <p:grpSpPr>
+        <a:xfrm>
+          <a:off x="0" y="0"/>
+          <a:ext cx="0" cy="0"/>
+          <a:chOff x="0" y="0"/>
+          <a:chExt cx="0" cy="0"/>
+        </a:xfrm>
+      </p:grpSpPr>
+      <p:sp>
+        <p:nvSpPr>
+          <p:cNvPr id="3" name="İçerik Yer Tutucusu 2">
+            <a:extLst>
+              <a:ext uri="{FF2B5EF4-FFF2-40B4-BE49-F238E27FC236}">
+                <a16:creationId xmlns:a16="http://schemas.microsoft.com/office/drawing/2014/main" id="{173967BA-7873-FF62-17E4-23520F01C814}"/>
+              </a:ext>
+            </a:extLst>
+          </p:cNvPr>
+          <p:cNvSpPr>
+            <a:spLocks noGrp="1"/>
+          </p:cNvSpPr>
+          <p:nvPr>
+            <p:ph idx="1"/>
+          </p:nvPr>
+        </p:nvSpPr>
+        <p:spPr>
+          <a:xfrm>
+            <a:off x="0" y="0"/>
+            <a:ext cx="12192000" cy="6858000"/>
+          </a:xfrm>
+        </p:spPr>
+        <p:txBody>
+          <a:bodyPr/>
+          <a:lstStyle/>
+          <a:p>
+            <a:pPr marL="0" indent="0">
+              <a:buNone/>
+            </a:pPr>
+            <a:r>
+              <a:rPr lang="tr-TR" dirty="0"/>
+              <a:t>					 </a:t>
+            </a:r>
+            <a:r>
+              <a:rPr lang="tr-TR" sz="2400" b="1" dirty="0">
+                <a:solidFill>
+                  <a:srgbClr val="FF0000"/>
+                </a:solidFill>
+              </a:rPr>
+              <a:t>INCLUDE</a:t>
+            </a:r>
+          </a:p>
+          <a:p>
+            <a:pPr marL="0" indent="0">
+              <a:buNone/>
+            </a:pPr>
+            <a:r>
+              <a:rPr lang="tr-TR" sz="1800" dirty="0"/>
+              <a:t>Program SE38 den oluşturulurken </a:t>
+            </a:r>
+            <a:r>
+              <a:rPr lang="tr-TR" sz="1800" dirty="0" err="1"/>
+              <a:t>include</a:t>
+            </a:r>
+            <a:r>
+              <a:rPr lang="tr-TR" sz="1800" dirty="0"/>
+              <a:t> türü seçilir.</a:t>
+            </a:r>
+          </a:p>
+          <a:p>
+            <a:pPr marL="0" indent="0">
+              <a:buNone/>
+            </a:pPr>
+            <a:r>
+              <a:rPr lang="tr-TR" dirty="0"/>
+              <a:t>					</a:t>
+            </a:r>
+          </a:p>
+          <a:p>
+            <a:pPr marL="0" indent="0">
+              <a:buNone/>
+            </a:pPr>
+            <a:r>
+              <a:rPr lang="tr-TR" sz="2400" dirty="0"/>
+              <a:t>					</a:t>
+            </a:r>
+            <a:r>
+              <a:rPr lang="tr-TR" sz="2400" b="1" dirty="0">
+                <a:solidFill>
+                  <a:srgbClr val="FF0000"/>
+                </a:solidFill>
+              </a:rPr>
+              <a:t> FM VE FG</a:t>
+            </a:r>
+          </a:p>
+          <a:p>
+            <a:pPr marL="0" indent="0">
+              <a:buNone/>
+            </a:pPr>
+            <a:r>
+              <a:rPr lang="tr-TR" sz="1800" dirty="0"/>
+              <a:t>Her fonksiyon bir FG altında olmak zorunda.</a:t>
+            </a:r>
+          </a:p>
+        </p:txBody>
+      </p:sp>
+      <p:pic>
+        <p:nvPicPr>
+          <p:cNvPr id="6" name="Resim 5" descr="metin, ekran görüntüsü, dikdörtgen, yazı tipi içeren bir resim&#10;&#10;Yapay zeka tarafından oluşturulmuş içerik yanlış olabilir.">
+            <a:extLst>
+              <a:ext uri="{FF2B5EF4-FFF2-40B4-BE49-F238E27FC236}">
+                <a16:creationId xmlns:a16="http://schemas.microsoft.com/office/drawing/2014/main" id="{3B09967D-EA74-5001-CFF8-660DD0BC1E2C}"/>
+              </a:ext>
+            </a:extLst>
+          </p:cNvPr>
+          <p:cNvPicPr>
+            <a:picLocks noChangeAspect="1"/>
+          </p:cNvPicPr>
+          <p:nvPr/>
+        </p:nvPicPr>
+        <p:blipFill>
+          <a:blip r:embed="rId2"/>
+          <a:stretch>
+            <a:fillRect/>
+          </a:stretch>
+        </p:blipFill>
+        <p:spPr>
+          <a:xfrm>
+            <a:off x="4796234" y="1927730"/>
+            <a:ext cx="7267948" cy="4477375"/>
+          </a:xfrm>
+          <a:prstGeom prst="rect">
+            <a:avLst/>
+          </a:prstGeom>
+        </p:spPr>
+      </p:pic>
+      <p:graphicFrame>
+        <p:nvGraphicFramePr>
+          <p:cNvPr id="7" name="Tablo 6">
+            <a:extLst>
+              <a:ext uri="{FF2B5EF4-FFF2-40B4-BE49-F238E27FC236}">
+                <a16:creationId xmlns:a16="http://schemas.microsoft.com/office/drawing/2014/main" id="{2FA6926E-1AE4-1EF8-333E-E352CB13DE51}"/>
+              </a:ext>
+            </a:extLst>
+          </p:cNvPr>
+          <p:cNvGraphicFramePr>
+            <a:graphicFrameLocks noGrp="1"/>
+          </p:cNvGraphicFramePr>
+          <p:nvPr>
+            <p:extLst>
+              <p:ext uri="{D42A27DB-BD31-4B8C-83A1-F6EECF244321}">
+                <p14:modId xmlns:p14="http://schemas.microsoft.com/office/powerpoint/2010/main" val="2781777586"/>
+              </p:ext>
+            </p:extLst>
+          </p:nvPr>
+        </p:nvGraphicFramePr>
+        <p:xfrm>
+          <a:off x="0" y="2400546"/>
+          <a:ext cx="4668416" cy="2468880"/>
+        </p:xfrm>
+        <a:graphic>
+          <a:graphicData uri="http://schemas.openxmlformats.org/drawingml/2006/table">
+            <a:tbl>
+              <a:tblPr/>
+              <a:tblGrid>
+                <a:gridCol w="2334208">
+                  <a:extLst>
+                    <a:ext uri="{9D8B030D-6E8A-4147-A177-3AD203B41FA5}">
+                      <a16:colId xmlns:a16="http://schemas.microsoft.com/office/drawing/2014/main" val="792684774"/>
+                    </a:ext>
+                  </a:extLst>
+                </a:gridCol>
+                <a:gridCol w="2334208">
+                  <a:extLst>
+                    <a:ext uri="{9D8B030D-6E8A-4147-A177-3AD203B41FA5}">
+                      <a16:colId xmlns:a16="http://schemas.microsoft.com/office/drawing/2014/main" val="310615751"/>
+                    </a:ext>
+                  </a:extLst>
+                </a:gridCol>
+              </a:tblGrid>
+              <a:tr h="306468">
+                <a:tc>
+                  <a:txBody>
+                    <a:bodyPr/>
+                    <a:lstStyle/>
+                    <a:p>
+                      <a:pPr>
+                        <a:buNone/>
+                      </a:pPr>
+                      <a:r>
+                        <a:rPr lang="tr-TR"/>
+                        <a:t>Sekme</a:t>
+                      </a:r>
+                    </a:p>
+                  </a:txBody>
+                  <a:tcPr anchor="ctr">
+                    <a:lnL>
+                      <a:noFill/>
+                    </a:lnL>
+                    <a:lnR>
+                      <a:noFill/>
+                    </a:lnR>
+                    <a:lnT>
+                      <a:noFill/>
+                    </a:lnT>
+                    <a:lnB>
+                      <a:noFill/>
+                    </a:lnB>
+                    <a:noFill/>
+                  </a:tcPr>
+                </a:tc>
+                <a:tc>
+                  <a:txBody>
+                    <a:bodyPr/>
+                    <a:lstStyle/>
+                    <a:p>
+                      <a:pPr>
+                        <a:buNone/>
+                      </a:pPr>
+                      <a:r>
+                        <a:rPr lang="tr-TR"/>
+                        <a:t>Ne yapar</a:t>
+                      </a:r>
+                    </a:p>
+                  </a:txBody>
+                  <a:tcPr anchor="ctr">
+                    <a:lnL>
+                      <a:noFill/>
+                    </a:lnL>
+                    <a:lnR>
+                      <a:noFill/>
+                    </a:lnR>
+                    <a:lnT>
+                      <a:noFill/>
+                    </a:lnT>
+                    <a:lnB>
+                      <a:noFill/>
+                    </a:lnB>
+                    <a:noFill/>
+                  </a:tcPr>
+                </a:tc>
+                <a:extLst>
+                  <a:ext uri="{0D108BD9-81ED-4DB2-BD59-A6C34878D82A}">
+                    <a16:rowId xmlns:a16="http://schemas.microsoft.com/office/drawing/2014/main" val="3990051408"/>
+                  </a:ext>
+                </a:extLst>
+              </a:tr>
+              <a:tr h="306468">
+                <a:tc>
+                  <a:txBody>
+                    <a:bodyPr/>
+                    <a:lstStyle/>
+                    <a:p>
+                      <a:pPr>
+                        <a:buNone/>
+                      </a:pPr>
+                      <a:r>
+                        <a:rPr lang="tr-TR"/>
+                        <a:t>IMPORT</a:t>
+                      </a:r>
+                    </a:p>
+                  </a:txBody>
+                  <a:tcPr anchor="ctr">
+                    <a:lnL>
+                      <a:noFill/>
+                    </a:lnL>
+                    <a:lnR>
+                      <a:noFill/>
+                    </a:lnR>
+                    <a:lnT>
+                      <a:noFill/>
+                    </a:lnT>
+                    <a:lnB>
+                      <a:noFill/>
+                    </a:lnB>
+                    <a:noFill/>
+                  </a:tcPr>
+                </a:tc>
+                <a:tc>
+                  <a:txBody>
+                    <a:bodyPr/>
+                    <a:lstStyle/>
+                    <a:p>
+                      <a:pPr>
+                        <a:buNone/>
+                      </a:pPr>
+                      <a:r>
+                        <a:rPr lang="tr-TR"/>
+                        <a:t>Dışarıdan alır</a:t>
+                      </a:r>
+                    </a:p>
+                  </a:txBody>
+                  <a:tcPr anchor="ctr">
+                    <a:lnL>
+                      <a:noFill/>
+                    </a:lnL>
+                    <a:lnR>
+                      <a:noFill/>
+                    </a:lnR>
+                    <a:lnT>
+                      <a:noFill/>
+                    </a:lnT>
+                    <a:lnB>
+                      <a:noFill/>
+                    </a:lnB>
+                    <a:noFill/>
+                  </a:tcPr>
+                </a:tc>
+                <a:extLst>
+                  <a:ext uri="{0D108BD9-81ED-4DB2-BD59-A6C34878D82A}">
+                    <a16:rowId xmlns:a16="http://schemas.microsoft.com/office/drawing/2014/main" val="2273826223"/>
+                  </a:ext>
+                </a:extLst>
+              </a:tr>
+              <a:tr h="306468">
+                <a:tc>
+                  <a:txBody>
+                    <a:bodyPr/>
+                    <a:lstStyle/>
+                    <a:p>
+                      <a:pPr>
+                        <a:buNone/>
+                      </a:pPr>
+                      <a:r>
+                        <a:rPr lang="tr-TR"/>
+                        <a:t>EXPORT</a:t>
+                      </a:r>
+                    </a:p>
+                  </a:txBody>
+                  <a:tcPr anchor="ctr">
+                    <a:lnL>
+                      <a:noFill/>
+                    </a:lnL>
+                    <a:lnR>
+                      <a:noFill/>
+                    </a:lnR>
+                    <a:lnT>
+                      <a:noFill/>
+                    </a:lnT>
+                    <a:lnB>
+                      <a:noFill/>
+                    </a:lnB>
+                    <a:noFill/>
+                  </a:tcPr>
+                </a:tc>
+                <a:tc>
+                  <a:txBody>
+                    <a:bodyPr/>
+                    <a:lstStyle/>
+                    <a:p>
+                      <a:pPr>
+                        <a:buNone/>
+                      </a:pPr>
+                      <a:r>
+                        <a:rPr lang="tr-TR"/>
+                        <a:t>Dışarı verir</a:t>
+                      </a:r>
+                    </a:p>
+                  </a:txBody>
+                  <a:tcPr anchor="ctr">
+                    <a:lnL>
+                      <a:noFill/>
+                    </a:lnL>
+                    <a:lnR>
+                      <a:noFill/>
+                    </a:lnR>
+                    <a:lnT>
+                      <a:noFill/>
+                    </a:lnT>
+                    <a:lnB>
+                      <a:noFill/>
+                    </a:lnB>
+                    <a:noFill/>
+                  </a:tcPr>
+                </a:tc>
+                <a:extLst>
+                  <a:ext uri="{0D108BD9-81ED-4DB2-BD59-A6C34878D82A}">
+                    <a16:rowId xmlns:a16="http://schemas.microsoft.com/office/drawing/2014/main" val="1332018562"/>
+                  </a:ext>
+                </a:extLst>
+              </a:tr>
+              <a:tr h="306468">
+                <a:tc>
+                  <a:txBody>
+                    <a:bodyPr/>
+                    <a:lstStyle/>
+                    <a:p>
+                      <a:pPr>
+                        <a:buNone/>
+                      </a:pPr>
+                      <a:r>
+                        <a:rPr lang="tr-TR"/>
+                        <a:t>CHANGING</a:t>
+                      </a:r>
+                    </a:p>
+                  </a:txBody>
+                  <a:tcPr anchor="ctr">
+                    <a:lnL>
+                      <a:noFill/>
+                    </a:lnL>
+                    <a:lnR>
+                      <a:noFill/>
+                    </a:lnR>
+                    <a:lnT>
+                      <a:noFill/>
+                    </a:lnT>
+                    <a:lnB>
+                      <a:noFill/>
+                    </a:lnB>
+                    <a:noFill/>
+                  </a:tcPr>
+                </a:tc>
+                <a:tc>
+                  <a:txBody>
+                    <a:bodyPr/>
+                    <a:lstStyle/>
+                    <a:p>
+                      <a:pPr>
+                        <a:buNone/>
+                      </a:pPr>
+                      <a:r>
+                        <a:rPr lang="tr-TR"/>
+                        <a:t>Alır + değiştirir</a:t>
+                      </a:r>
+                    </a:p>
+                  </a:txBody>
+                  <a:tcPr anchor="ctr">
+                    <a:lnL>
+                      <a:noFill/>
+                    </a:lnL>
+                    <a:lnR>
+                      <a:noFill/>
+                    </a:lnR>
+                    <a:lnT>
+                      <a:noFill/>
+                    </a:lnT>
+                    <a:lnB>
+                      <a:noFill/>
+                    </a:lnB>
+                    <a:noFill/>
+                  </a:tcPr>
+                </a:tc>
+                <a:extLst>
+                  <a:ext uri="{0D108BD9-81ED-4DB2-BD59-A6C34878D82A}">
+                    <a16:rowId xmlns:a16="http://schemas.microsoft.com/office/drawing/2014/main" val="986690192"/>
+                  </a:ext>
+                </a:extLst>
+              </a:tr>
+              <a:tr h="306468">
+                <a:tc>
+                  <a:txBody>
+                    <a:bodyPr/>
+                    <a:lstStyle/>
+                    <a:p>
+                      <a:pPr>
+                        <a:buNone/>
+                      </a:pPr>
+                      <a:r>
+                        <a:rPr lang="tr-TR"/>
+                        <a:t>TABLES</a:t>
+                      </a:r>
+                    </a:p>
+                  </a:txBody>
+                  <a:tcPr anchor="ctr">
+                    <a:lnL>
+                      <a:noFill/>
+                    </a:lnL>
+                    <a:lnR>
+                      <a:noFill/>
+                    </a:lnR>
+                    <a:lnT>
+                      <a:noFill/>
+                    </a:lnT>
+                    <a:lnB>
+                      <a:noFill/>
+                    </a:lnB>
+                    <a:noFill/>
+                  </a:tcPr>
+                </a:tc>
+                <a:tc>
+                  <a:txBody>
+                    <a:bodyPr/>
+                    <a:lstStyle/>
+                    <a:p>
+                      <a:pPr>
+                        <a:buNone/>
+                      </a:pPr>
+                      <a:r>
+                        <a:rPr lang="tr-TR"/>
+                        <a:t>İç tablo alır</a:t>
+                      </a:r>
+                    </a:p>
+                  </a:txBody>
+                  <a:tcPr anchor="ctr">
+                    <a:lnL>
+                      <a:noFill/>
+                    </a:lnL>
+                    <a:lnR>
+                      <a:noFill/>
+                    </a:lnR>
+                    <a:lnT>
+                      <a:noFill/>
+                    </a:lnT>
+                    <a:lnB>
+                      <a:noFill/>
+                    </a:lnB>
+                    <a:noFill/>
+                  </a:tcPr>
+                </a:tc>
+                <a:extLst>
+                  <a:ext uri="{0D108BD9-81ED-4DB2-BD59-A6C34878D82A}">
+                    <a16:rowId xmlns:a16="http://schemas.microsoft.com/office/drawing/2014/main" val="4108419774"/>
+                  </a:ext>
+                </a:extLst>
+              </a:tr>
+              <a:tr h="306468">
+                <a:tc>
+                  <a:txBody>
+                    <a:bodyPr/>
+                    <a:lstStyle/>
+                    <a:p>
+                      <a:pPr>
+                        <a:buNone/>
+                      </a:pPr>
+                      <a:r>
+                        <a:rPr lang="tr-TR" dirty="0"/>
+                        <a:t>EXCEPTIONS</a:t>
+                      </a:r>
+                    </a:p>
+                    <a:p>
+                      <a:pPr>
+                        <a:buNone/>
+                      </a:pPr>
+                      <a:r>
+                        <a:rPr lang="tr-TR" dirty="0"/>
+                        <a:t>SOURCE CODE</a:t>
+                      </a:r>
+                    </a:p>
+                  </a:txBody>
+                  <a:tcPr anchor="ctr">
+                    <a:lnL>
+                      <a:noFill/>
+                    </a:lnL>
+                    <a:lnR>
+                      <a:noFill/>
+                    </a:lnR>
+                    <a:lnT>
+                      <a:noFill/>
+                    </a:lnT>
+                    <a:lnB>
+                      <a:noFill/>
+                    </a:lnB>
+                    <a:noFill/>
+                  </a:tcPr>
+                </a:tc>
+                <a:tc>
+                  <a:txBody>
+                    <a:bodyPr/>
+                    <a:lstStyle/>
+                    <a:p>
+                      <a:pPr>
+                        <a:buNone/>
+                      </a:pPr>
+                      <a:r>
+                        <a:rPr lang="tr-TR" dirty="0"/>
+                        <a:t>Hata yönetimi</a:t>
+                      </a:r>
+                    </a:p>
+                    <a:p>
+                      <a:pPr>
+                        <a:buNone/>
+                      </a:pPr>
+                      <a:endParaRPr lang="tr-TR" dirty="0"/>
+                    </a:p>
+                  </a:txBody>
+                  <a:tcPr anchor="ctr">
+                    <a:lnL>
+                      <a:noFill/>
+                    </a:lnL>
+                    <a:lnR>
+                      <a:noFill/>
+                    </a:lnR>
+                    <a:lnT>
+                      <a:noFill/>
+                    </a:lnT>
+                    <a:lnB>
+                      <a:noFill/>
+                    </a:lnB>
+                    <a:noFill/>
+                  </a:tcPr>
+                </a:tc>
+                <a:extLst>
+                  <a:ext uri="{0D108BD9-81ED-4DB2-BD59-A6C34878D82A}">
+                    <a16:rowId xmlns:a16="http://schemas.microsoft.com/office/drawing/2014/main" val="1657234671"/>
+                  </a:ext>
+                </a:extLst>
+              </a:tr>
+            </a:tbl>
+          </a:graphicData>
+        </a:graphic>
+      </p:graphicFrame>
+      <p:sp>
+        <p:nvSpPr>
+          <p:cNvPr id="9" name="Metin kutusu 8">
+            <a:extLst>
+              <a:ext uri="{FF2B5EF4-FFF2-40B4-BE49-F238E27FC236}">
+                <a16:creationId xmlns:a16="http://schemas.microsoft.com/office/drawing/2014/main" id="{9CF81B8D-7439-7A70-A0D8-49903DFA2ED6}"/>
+              </a:ext>
+            </a:extLst>
+          </p:cNvPr>
+          <p:cNvSpPr txBox="1"/>
+          <p:nvPr/>
+        </p:nvSpPr>
+        <p:spPr>
+          <a:xfrm>
+            <a:off x="0" y="4986550"/>
+            <a:ext cx="4668416" cy="1754326"/>
+          </a:xfrm>
+          <a:prstGeom prst="rect">
+            <a:avLst/>
+          </a:prstGeom>
+          <a:noFill/>
+        </p:spPr>
+        <p:txBody>
+          <a:bodyPr wrap="square">
+            <a:spAutoFit/>
+          </a:bodyPr>
+          <a:lstStyle/>
+          <a:p>
+            <a:pPr>
+              <a:buNone/>
+            </a:pPr>
+            <a:r>
+              <a:rPr lang="tr-TR" b="1" dirty="0" err="1"/>
+              <a:t>Opt</a:t>
+            </a:r>
+            <a:r>
+              <a:rPr lang="tr-TR" b="1" dirty="0"/>
+              <a:t>. (</a:t>
+            </a:r>
+            <a:r>
+              <a:rPr lang="tr-TR" b="1" dirty="0" err="1"/>
+              <a:t>Optional</a:t>
+            </a:r>
+            <a:r>
+              <a:rPr lang="tr-TR" b="1" dirty="0"/>
+              <a:t>)</a:t>
+            </a:r>
+          </a:p>
+          <a:p>
+            <a:pPr>
+              <a:buNone/>
+            </a:pPr>
+            <a:r>
+              <a:rPr lang="tr-TR" dirty="0"/>
+              <a:t>İşaretliyse parametre </a:t>
+            </a:r>
+            <a:r>
+              <a:rPr lang="tr-TR" b="1" dirty="0"/>
+              <a:t>zorunlu değildir.</a:t>
+            </a:r>
+            <a:br>
+              <a:rPr lang="tr-TR" dirty="0"/>
+            </a:br>
+            <a:endParaRPr lang="tr-TR" dirty="0"/>
+          </a:p>
+          <a:p>
+            <a:pPr>
+              <a:buNone/>
+            </a:pPr>
+            <a:r>
+              <a:rPr lang="tr-TR" b="1" dirty="0" err="1"/>
+              <a:t>Pass</a:t>
+            </a:r>
+            <a:r>
+              <a:rPr lang="tr-TR" b="1" dirty="0"/>
+              <a:t>. (</a:t>
+            </a:r>
+            <a:r>
+              <a:rPr lang="tr-TR" b="1" dirty="0" err="1"/>
+              <a:t>Pass</a:t>
+            </a:r>
+            <a:r>
+              <a:rPr lang="tr-TR" b="1" dirty="0"/>
+              <a:t> </a:t>
+            </a:r>
+            <a:r>
+              <a:rPr lang="tr-TR" b="1" dirty="0" err="1"/>
+              <a:t>value</a:t>
+            </a:r>
+            <a:r>
+              <a:rPr lang="tr-TR" b="1" dirty="0"/>
+              <a:t>)</a:t>
+            </a:r>
+          </a:p>
+          <a:p>
+            <a:pPr>
+              <a:buNone/>
+            </a:pPr>
+            <a:r>
+              <a:rPr lang="tr-TR" dirty="0"/>
+              <a:t> İşaretlenirse değeri </a:t>
+            </a:r>
+            <a:r>
+              <a:rPr lang="tr-TR" dirty="0" err="1"/>
+              <a:t>değiştirebilir.Ama</a:t>
+            </a:r>
+            <a:r>
+              <a:rPr lang="tr-TR" dirty="0"/>
+              <a:t> </a:t>
+            </a:r>
+            <a:r>
+              <a:rPr lang="tr-TR" dirty="0" err="1"/>
+              <a:t>importların</a:t>
+            </a:r>
+            <a:r>
+              <a:rPr lang="tr-TR" dirty="0"/>
+              <a:t> değiştirilmesi anlamsız.</a:t>
+            </a:r>
+          </a:p>
+        </p:txBody>
+      </p:sp>
+    </p:spTree>
+    <p:extLst>
+      <p:ext uri="{BB962C8B-B14F-4D97-AF65-F5344CB8AC3E}">
+        <p14:creationId xmlns:p14="http://schemas.microsoft.com/office/powerpoint/2010/main" val="150032418"/>
+      </p:ext>
+    </p:extLst>
+  </p:cSld>
+  <p:clrMapOvr>
+    <a:masterClrMapping/>
+  </p:clrMapOvr>
+</p:sld>
+</file>
+
+<file path=ppt/slides/slide8.xml><?xml version="1.0" encoding="utf-8"?>
+<p:sld xmlns:a="http://schemas.openxmlformats.org/drawingml/2006/main" xmlns:r="http://schemas.openxmlformats.org/officeDocument/2006/relationships" xmlns:p="http://schemas.openxmlformats.org/presentationml/2006/main">
+  <p:cSld>
+    <p:spTree>
+      <p:nvGrpSpPr>
+        <p:cNvPr id="1" name=""/>
+        <p:cNvGrpSpPr/>
+        <p:nvPr/>
+      </p:nvGrpSpPr>
+      <p:grpSpPr>
+        <a:xfrm>
+          <a:off x="0" y="0"/>
+          <a:ext cx="0" cy="0"/>
+          <a:chOff x="0" y="0"/>
+          <a:chExt cx="0" cy="0"/>
+        </a:xfrm>
+      </p:grpSpPr>
+      <p:sp>
+        <p:nvSpPr>
+          <p:cNvPr id="3" name="İçerik Yer Tutucusu 2">
+            <a:extLst>
+              <a:ext uri="{FF2B5EF4-FFF2-40B4-BE49-F238E27FC236}">
+                <a16:creationId xmlns:a16="http://schemas.microsoft.com/office/drawing/2014/main" id="{80F7B06A-7EDC-810F-A499-73D520E4154B}"/>
+              </a:ext>
+            </a:extLst>
+          </p:cNvPr>
+          <p:cNvSpPr>
+            <a:spLocks noGrp="1"/>
+          </p:cNvSpPr>
+          <p:nvPr>
+            <p:ph idx="1"/>
+          </p:nvPr>
+        </p:nvSpPr>
+        <p:spPr>
+          <a:xfrm>
+            <a:off x="0" y="0"/>
+            <a:ext cx="12192000" cy="6858000"/>
+          </a:xfrm>
+        </p:spPr>
+        <p:txBody>
+          <a:bodyPr>
+            <a:normAutofit/>
+          </a:bodyPr>
+          <a:lstStyle/>
+          <a:p>
+            <a:r>
+              <a:rPr lang="tr-TR" sz="1800" dirty="0"/>
+              <a:t>Fonksiyon programda örnek kısmından çağrılır.</a:t>
+            </a:r>
+          </a:p>
+        </p:txBody>
+      </p:sp>
+    </p:spTree>
+    <p:extLst>
+      <p:ext uri="{BB962C8B-B14F-4D97-AF65-F5344CB8AC3E}">
+        <p14:creationId xmlns:p14="http://schemas.microsoft.com/office/powerpoint/2010/main" val="1500483298"/>
+      </p:ext>
+    </p:extLst>
+  </p:cSld>
+  <p:clrMapOvr>
+    <a:masterClrMapping/>
+  </p:clrMapOvr>
+</p:sld>
+</file>
+
+<file path=ppt/slides/slide9.xml><?xml version="1.0" encoding="utf-8"?>
+<p:sld xmlns:a="http://schemas.openxmlformats.org/drawingml/2006/main" xmlns:r="http://schemas.openxmlformats.org/officeDocument/2006/relationships" xmlns:p="http://schemas.openxmlformats.org/presentationml/2006/main">
+  <p:cSld>
+    <p:spTree>
+      <p:nvGrpSpPr>
+        <p:cNvPr id="1" name="">
+          <a:extLst>
+            <a:ext uri="{FF2B5EF4-FFF2-40B4-BE49-F238E27FC236}">
+              <a16:creationId xmlns:a16="http://schemas.microsoft.com/office/drawing/2014/main" id="{5B4E7120-8F5A-915C-01BD-C100C28BF220}"/>
+            </a:ext>
+          </a:extLst>
+        </p:cNvPr>
+        <p:cNvGrpSpPr/>
+        <p:nvPr/>
+      </p:nvGrpSpPr>
+      <p:grpSpPr>
+        <a:xfrm>
+          <a:off x="0" y="0"/>
+          <a:ext cx="0" cy="0"/>
+          <a:chOff x="0" y="0"/>
+          <a:chExt cx="0" cy="0"/>
+        </a:xfrm>
+      </p:grpSpPr>
+      <p:sp>
+        <p:nvSpPr>
+          <p:cNvPr id="3" name="İçerik Yer Tutucusu 2">
+            <a:extLst>
+              <a:ext uri="{FF2B5EF4-FFF2-40B4-BE49-F238E27FC236}">
+                <a16:creationId xmlns:a16="http://schemas.microsoft.com/office/drawing/2014/main" id="{30E944E6-CF5B-3127-D1D0-68F77E59972D}"/>
+              </a:ext>
+            </a:extLst>
+          </p:cNvPr>
+          <p:cNvSpPr>
+            <a:spLocks noGrp="1"/>
+          </p:cNvSpPr>
+          <p:nvPr>
+            <p:ph idx="1"/>
+          </p:nvPr>
+        </p:nvSpPr>
+        <p:spPr>
+          <a:xfrm>
+            <a:off x="0" y="0"/>
+            <a:ext cx="12192000" cy="6858000"/>
+          </a:xfrm>
+        </p:spPr>
+        <p:txBody>
+          <a:bodyPr/>
+          <a:lstStyle/>
+          <a:p>
+            <a:endParaRPr lang="tr-TR" dirty="0"/>
+          </a:p>
+        </p:txBody>
+      </p:sp>
+    </p:spTree>
+    <p:extLst>
+      <p:ext uri="{BB962C8B-B14F-4D97-AF65-F5344CB8AC3E}">
+        <p14:creationId xmlns:p14="http://schemas.microsoft.com/office/powerpoint/2010/main" val="4175651167"/>
       </p:ext>
     </p:extLst>
   </p:cSld>

</xml_diff>